<commit_message>
update slides and notebook
</commit_message>
<xml_diff>
--- a/PNREC/PNREC slides.pptx
+++ b/PNREC/PNREC slides.pptx
@@ -8,20 +8,23 @@
     <p:sldId id="256" r:id="rId2"/>
     <p:sldId id="257" r:id="rId3"/>
     <p:sldId id="258" r:id="rId4"/>
-    <p:sldId id="268" r:id="rId5"/>
-    <p:sldId id="259" r:id="rId6"/>
-    <p:sldId id="260" r:id="rId7"/>
-    <p:sldId id="269" r:id="rId8"/>
-    <p:sldId id="275" r:id="rId9"/>
-    <p:sldId id="270" r:id="rId10"/>
-    <p:sldId id="272" r:id="rId11"/>
+    <p:sldId id="270" r:id="rId5"/>
+    <p:sldId id="272" r:id="rId6"/>
+    <p:sldId id="268" r:id="rId7"/>
+    <p:sldId id="260" r:id="rId8"/>
+    <p:sldId id="269" r:id="rId9"/>
+    <p:sldId id="275" r:id="rId10"/>
+    <p:sldId id="277" r:id="rId11"/>
     <p:sldId id="261" r:id="rId12"/>
     <p:sldId id="267" r:id="rId13"/>
     <p:sldId id="271" r:id="rId14"/>
     <p:sldId id="263" r:id="rId15"/>
     <p:sldId id="273" r:id="rId16"/>
     <p:sldId id="274" r:id="rId17"/>
-    <p:sldId id="264" r:id="rId18"/>
+    <p:sldId id="278" r:id="rId18"/>
+    <p:sldId id="280" r:id="rId19"/>
+    <p:sldId id="264" r:id="rId20"/>
+    <p:sldId id="279" r:id="rId21"/>
   </p:sldIdLst>
   <p:sldSz cx="12192000" cy="6858000"/>
   <p:notesSz cx="6858000" cy="9144000"/>
@@ -293,7 +296,7 @@
           <a:p>
             <a:fld id="{72EA7947-E287-4738-8C82-07CE4F01EF03}" type="datetime2">
               <a:rPr lang="en-US" smtClean="0"/>
-              <a:t>Thursday, May 16, 2024</a:t>
+              <a:t>Friday, May 17, 2024</a:t>
             </a:fld>
             <a:endParaRPr lang="en-US" dirty="0"/>
           </a:p>
@@ -1329,7 +1332,7 @@
           <a:p>
             <a:fld id="{EE2EBD84-71F4-4271-8C46-0D47C0A9B12E}" type="datetime2">
               <a:rPr lang="en-US" smtClean="0"/>
-              <a:t>Thursday, May 16, 2024</a:t>
+              <a:t>Friday, May 17, 2024</a:t>
             </a:fld>
             <a:endParaRPr lang="en-US"/>
           </a:p>
@@ -1540,7 +1543,7 @@
           <a:p>
             <a:fld id="{ABAE0CE1-F450-4107-B2CB-17B18F8A3F4A}" type="datetime2">
               <a:rPr lang="en-US" smtClean="0"/>
-              <a:t>Thursday, May 16, 2024</a:t>
+              <a:t>Friday, May 17, 2024</a:t>
             </a:fld>
             <a:endParaRPr lang="en-US"/>
           </a:p>
@@ -2250,7 +2253,7 @@
           <a:p>
             <a:fld id="{6FE8C025-CD7A-4966-867E-81CF82B15267}" type="datetime2">
               <a:rPr lang="en-US" smtClean="0"/>
-              <a:t>Thursday, May 16, 2024</a:t>
+              <a:t>Friday, May 17, 2024</a:t>
             </a:fld>
             <a:endParaRPr lang="en-US"/>
           </a:p>
@@ -2870,7 +2873,7 @@
           <a:p>
             <a:fld id="{FE809929-0719-4517-94D6-FDF7F99E70F6}" type="datetime2">
               <a:rPr lang="en-US" smtClean="0"/>
-              <a:t>Thursday, May 16, 2024</a:t>
+              <a:t>Friday, May 17, 2024</a:t>
             </a:fld>
             <a:endParaRPr lang="en-US"/>
           </a:p>
@@ -3988,7 +3991,7 @@
           <a:p>
             <a:fld id="{20E95673-5512-4AAA-9AEB-E00C61EC65D5}" type="datetime2">
               <a:rPr lang="en-US" smtClean="0"/>
-              <a:t>Thursday, May 16, 2024</a:t>
+              <a:t>Friday, May 17, 2024</a:t>
             </a:fld>
             <a:endParaRPr lang="en-US"/>
           </a:p>
@@ -4535,7 +4538,7 @@
           <a:p>
             <a:fld id="{C13138FA-2E87-4873-8BBA-13E447C9A99A}" type="datetime2">
               <a:rPr lang="en-US" smtClean="0"/>
-              <a:t>Thursday, May 16, 2024</a:t>
+              <a:t>Friday, May 17, 2024</a:t>
             </a:fld>
             <a:endParaRPr lang="en-US"/>
           </a:p>
@@ -4696,7 +4699,7 @@
           <a:p>
             <a:fld id="{D75BB40A-97BD-4BFB-B639-0BFF95FDE8B7}" type="datetime2">
               <a:rPr lang="en-US" smtClean="0"/>
-              <a:t>Thursday, May 16, 2024</a:t>
+              <a:t>Friday, May 17, 2024</a:t>
             </a:fld>
             <a:endParaRPr lang="en-US"/>
           </a:p>
@@ -5731,7 +5734,7 @@
           <a:p>
             <a:fld id="{9EE9E0E3-ECF6-4CFE-8698-AEFEBCECC3C0}" type="datetime2">
               <a:rPr lang="en-US" smtClean="0"/>
-              <a:t>Thursday, May 16, 2024</a:t>
+              <a:t>Friday, May 17, 2024</a:t>
             </a:fld>
             <a:endParaRPr lang="en-US"/>
           </a:p>
@@ -6377,7 +6380,7 @@
           <a:p>
             <a:fld id="{251462FC-960E-4740-921F-B36862979F21}" type="datetime2">
               <a:rPr lang="en-US" smtClean="0"/>
-              <a:t>Thursday, May 16, 2024</a:t>
+              <a:t>Friday, May 17, 2024</a:t>
             </a:fld>
             <a:endParaRPr lang="en-US"/>
           </a:p>
@@ -7141,7 +7144,7 @@
           <a:p>
             <a:fld id="{E50BC9E2-CB44-4C05-9BB5-496C18A241E0}" type="datetime2">
               <a:rPr lang="en-US" smtClean="0"/>
-              <a:t>Thursday, May 16, 2024</a:t>
+              <a:t>Friday, May 17, 2024</a:t>
             </a:fld>
             <a:endParaRPr lang="en-US"/>
           </a:p>
@@ -7394,7 +7397,7 @@
           <a:p>
             <a:fld id="{246CB39B-5F4C-4A7E-9BE3-AAFD45576D16}" type="datetime2">
               <a:rPr lang="en-US" smtClean="0"/>
-              <a:t>Thursday, May 16, 2024</a:t>
+              <a:t>Friday, May 17, 2024</a:t>
             </a:fld>
             <a:endParaRPr lang="en-US" dirty="0"/>
           </a:p>
@@ -8589,41 +8592,110 @@
           </a:custGeom>
         </p:spPr>
       </p:pic>
+      <p:pic>
+        <p:nvPicPr>
+          <p:cNvPr id="6" name="Picture 5" descr="A black and white logo&#10;&#10;Description automatically generated">
+            <a:extLst>
+              <a:ext uri="{FF2B5EF4-FFF2-40B4-BE49-F238E27FC236}">
+                <a16:creationId xmlns:a16="http://schemas.microsoft.com/office/drawing/2014/main" id="{9966CE7A-FD2B-798C-0CBF-2F854F712782}"/>
+              </a:ext>
+            </a:extLst>
+          </p:cNvPr>
+          <p:cNvPicPr>
+            <a:picLocks noChangeAspect="1"/>
+          </p:cNvPicPr>
+          <p:nvPr/>
+        </p:nvPicPr>
+        <p:blipFill>
+          <a:blip r:embed="rId3"/>
+          <a:stretch>
+            <a:fillRect/>
+          </a:stretch>
+        </p:blipFill>
+        <p:spPr>
+          <a:xfrm>
+            <a:off x="7093298" y="5194944"/>
+            <a:ext cx="4177818" cy="817064"/>
+          </a:xfrm>
+          <a:prstGeom prst="rect">
+            <a:avLst/>
+          </a:prstGeom>
+        </p:spPr>
+      </p:pic>
       <p:sp>
         <p:nvSpPr>
-          <p:cNvPr id="5" name="TextBox 4">
-            <a:extLst>
-              <a:ext uri="{FF2B5EF4-FFF2-40B4-BE49-F238E27FC236}">
-                <a16:creationId xmlns:a16="http://schemas.microsoft.com/office/drawing/2014/main" id="{A6A8E72A-AC48-CD15-7E25-6DD40D5B2D23}"/>
-              </a:ext>
-            </a:extLst>
-          </p:cNvPr>
-          <p:cNvSpPr txBox="1"/>
+          <p:cNvPr id="8" name="Rectangle 7">
+            <a:extLst>
+              <a:ext uri="{FF2B5EF4-FFF2-40B4-BE49-F238E27FC236}">
+                <a16:creationId xmlns:a16="http://schemas.microsoft.com/office/drawing/2014/main" id="{6DF74755-A58E-1987-8C89-6C75468CFF85}"/>
+              </a:ext>
+            </a:extLst>
+          </p:cNvPr>
+          <p:cNvSpPr/>
           <p:nvPr/>
         </p:nvSpPr>
         <p:spPr>
           <a:xfrm>
-            <a:off x="8972551" y="5456504"/>
-            <a:ext cx="2668586" cy="369332"/>
+            <a:off x="7039627" y="5194944"/>
+            <a:ext cx="4409162" cy="892705"/>
           </a:xfrm>
           <a:prstGeom prst="rect">
             <a:avLst/>
           </a:prstGeom>
-          <a:noFill/>
         </p:spPr>
+        <p:style>
+          <a:lnRef idx="2">
+            <a:schemeClr val="accent6"/>
+          </a:lnRef>
+          <a:fillRef idx="1">
+            <a:schemeClr val="lt1"/>
+          </a:fillRef>
+          <a:effectRef idx="0">
+            <a:schemeClr val="accent6"/>
+          </a:effectRef>
+          <a:fontRef idx="minor">
+            <a:schemeClr val="dk1"/>
+          </a:fontRef>
+        </p:style>
         <p:txBody>
-          <a:bodyPr wrap="square" rtlCol="0">
-            <a:spAutoFit/>
-          </a:bodyPr>
+          <a:bodyPr rtlCol="0" anchor="ctr"/>
           <a:lstStyle/>
           <a:p>
-            <a:r>
-              <a:rPr lang="en-US" dirty="0"/>
-              <a:t>[WSU LOGO HERE]</a:t>
-            </a:r>
+            <a:pPr algn="ctr"/>
+            <a:endParaRPr lang="en-US" dirty="0"/>
           </a:p>
         </p:txBody>
       </p:sp>
+      <p:pic>
+        <p:nvPicPr>
+          <p:cNvPr id="14" name="Picture 13" descr="A black and white logo&#10;&#10;Description automatically generated">
+            <a:extLst>
+              <a:ext uri="{FF2B5EF4-FFF2-40B4-BE49-F238E27FC236}">
+                <a16:creationId xmlns:a16="http://schemas.microsoft.com/office/drawing/2014/main" id="{535964D1-F577-A13D-D73E-0A93EA1F0688}"/>
+              </a:ext>
+            </a:extLst>
+          </p:cNvPr>
+          <p:cNvPicPr>
+            <a:picLocks noChangeAspect="1"/>
+          </p:cNvPicPr>
+          <p:nvPr/>
+        </p:nvPicPr>
+        <p:blipFill>
+          <a:blip r:embed="rId3"/>
+          <a:stretch>
+            <a:fillRect/>
+          </a:stretch>
+        </p:blipFill>
+        <p:spPr>
+          <a:xfrm>
+            <a:off x="7146969" y="5192740"/>
+            <a:ext cx="4177818" cy="817064"/>
+          </a:xfrm>
+          <a:prstGeom prst="rect">
+            <a:avLst/>
+          </a:prstGeom>
+        </p:spPr>
+      </p:pic>
     </p:spTree>
     <p:extLst>
       <p:ext uri="{BB962C8B-B14F-4D97-AF65-F5344CB8AC3E}">
@@ -8656,10 +8728,10 @@
       </p:grpSpPr>
       <p:pic>
         <p:nvPicPr>
-          <p:cNvPr id="5" name="Picture 4" descr="A chart of different colored squares&#10;&#10;Description automatically generated">
-            <a:extLst>
-              <a:ext uri="{FF2B5EF4-FFF2-40B4-BE49-F238E27FC236}">
-                <a16:creationId xmlns:a16="http://schemas.microsoft.com/office/drawing/2014/main" id="{459737C4-AC13-0311-C1B4-46ADC826212F}"/>
+          <p:cNvPr id="7" name="Picture 6" descr="A graph of a cargo ship&#10;&#10;Description automatically generated with medium confidence">
+            <a:extLst>
+              <a:ext uri="{FF2B5EF4-FFF2-40B4-BE49-F238E27FC236}">
+                <a16:creationId xmlns:a16="http://schemas.microsoft.com/office/drawing/2014/main" id="{5EBA9F59-BC0C-8F3C-1D0E-96BC6ECF9C6A}"/>
               </a:ext>
             </a:extLst>
           </p:cNvPr>
@@ -8676,8 +8748,8 @@
         </p:blipFill>
         <p:spPr>
           <a:xfrm>
-            <a:off x="438647" y="286026"/>
-            <a:ext cx="11314706" cy="6285948"/>
+            <a:off x="358140" y="241300"/>
+            <a:ext cx="11475720" cy="6375400"/>
           </a:xfrm>
           <a:prstGeom prst="rect">
             <a:avLst/>
@@ -8687,7 +8759,7 @@
     </p:spTree>
     <p:extLst>
       <p:ext uri="{BB962C8B-B14F-4D97-AF65-F5344CB8AC3E}">
-        <p14:creationId xmlns:p14="http://schemas.microsoft.com/office/powerpoint/2010/main" val="2094747406"/>
+        <p14:creationId xmlns:p14="http://schemas.microsoft.com/office/powerpoint/2010/main" val="32356986"/>
       </p:ext>
     </p:extLst>
   </p:cSld>
@@ -8767,13 +8839,13 @@
               <a:p>
                 <a:r>
                   <a:rPr lang="en-US" dirty="0"/>
-                  <a:t>OCAs are not utilized on all lanes</a:t>
+                  <a:t>OCAs are not utilized on all lanes, and utilization varies over time.</a:t>
                 </a:r>
               </a:p>
               <a:p>
                 <a:r>
                   <a:rPr lang="en-US" dirty="0"/>
-                  <a:t>Impacts of OCAs on a given lane should be proportional to utilization </a:t>
+                  <a:t>Premise: Impacts of OCAs on a given lane are proportional to utilization </a:t>
                 </a:r>
               </a:p>
               <a:p>
@@ -9103,10 +9175,10 @@
       </p:grpSpPr>
       <p:pic>
         <p:nvPicPr>
-          <p:cNvPr id="5" name="Picture 4" descr="A graph of red and blue lines&#10;&#10;Description automatically generated">
-            <a:extLst>
-              <a:ext uri="{FF2B5EF4-FFF2-40B4-BE49-F238E27FC236}">
-                <a16:creationId xmlns:a16="http://schemas.microsoft.com/office/drawing/2014/main" id="{61161BB2-5D9A-AC04-F1F6-6A347F2CECAA}"/>
+          <p:cNvPr id="3" name="Picture 2" descr="A graph of a line graph&#10;&#10;Description automatically generated with medium confidence">
+            <a:extLst>
+              <a:ext uri="{FF2B5EF4-FFF2-40B4-BE49-F238E27FC236}">
+                <a16:creationId xmlns:a16="http://schemas.microsoft.com/office/drawing/2014/main" id="{8978D35C-2A8C-C73F-B3C6-BCEC75E940DA}"/>
               </a:ext>
             </a:extLst>
           </p:cNvPr>
@@ -9123,8 +9195,8 @@
         </p:blipFill>
         <p:spPr>
           <a:xfrm>
-            <a:off x="461897" y="298943"/>
-            <a:ext cx="11268205" cy="6260114"/>
+            <a:off x="442856" y="288364"/>
+            <a:ext cx="11306288" cy="6281271"/>
           </a:xfrm>
           <a:prstGeom prst="rect">
             <a:avLst/>
@@ -9163,10 +9235,10 @@
       </p:grpSpPr>
       <p:pic>
         <p:nvPicPr>
-          <p:cNvPr id="8" name="Picture 7" descr="A graph with different colored lines&#10;&#10;Description automatically generated">
-            <a:extLst>
-              <a:ext uri="{FF2B5EF4-FFF2-40B4-BE49-F238E27FC236}">
-                <a16:creationId xmlns:a16="http://schemas.microsoft.com/office/drawing/2014/main" id="{E0828031-824F-8B1C-FA0B-E9FEC4A62F85}"/>
+          <p:cNvPr id="3" name="Picture 2" descr="A graph with different colored lines&#10;&#10;Description automatically generated">
+            <a:extLst>
+              <a:ext uri="{FF2B5EF4-FFF2-40B4-BE49-F238E27FC236}">
+                <a16:creationId xmlns:a16="http://schemas.microsoft.com/office/drawing/2014/main" id="{0EFFA968-E5D5-C03D-4858-3B07DE37C5B9}"/>
               </a:ext>
             </a:extLst>
           </p:cNvPr>
@@ -9183,8 +9255,8 @@
         </p:blipFill>
         <p:spPr>
           <a:xfrm>
-            <a:off x="429701" y="281056"/>
-            <a:ext cx="11332597" cy="6295887"/>
+            <a:off x="370242" y="248023"/>
+            <a:ext cx="11451515" cy="6361953"/>
           </a:xfrm>
           <a:prstGeom prst="rect">
             <a:avLst/>
@@ -9223,10 +9295,10 @@
       </p:grpSpPr>
       <p:pic>
         <p:nvPicPr>
-          <p:cNvPr id="7" name="Picture 6" descr="A graph of a graph&#10;&#10;Description automatically generated with medium confidence">
-            <a:extLst>
-              <a:ext uri="{FF2B5EF4-FFF2-40B4-BE49-F238E27FC236}">
-                <a16:creationId xmlns:a16="http://schemas.microsoft.com/office/drawing/2014/main" id="{9E3F2936-58AA-9D25-3560-132F299C4DF5}"/>
+          <p:cNvPr id="3" name="Picture 2" descr="A graph with red and blue lines&#10;&#10;Description automatically generated">
+            <a:extLst>
+              <a:ext uri="{FF2B5EF4-FFF2-40B4-BE49-F238E27FC236}">
+                <a16:creationId xmlns:a16="http://schemas.microsoft.com/office/drawing/2014/main" id="{4D25BF75-541D-EBE6-7D64-5CA8551F4EA7}"/>
               </a:ext>
             </a:extLst>
           </p:cNvPr>
@@ -9243,8 +9315,8 @@
         </p:blipFill>
         <p:spPr>
           <a:xfrm>
-            <a:off x="419100" y="275166"/>
-            <a:ext cx="11353800" cy="6307667"/>
+            <a:off x="382344" y="254747"/>
+            <a:ext cx="11427311" cy="6348506"/>
           </a:xfrm>
           <a:prstGeom prst="rect">
             <a:avLst/>
@@ -9283,10 +9355,10 @@
       </p:grpSpPr>
       <p:pic>
         <p:nvPicPr>
-          <p:cNvPr id="5" name="Picture 4" descr="A graph showing the growth of a stock market&#10;&#10;Description automatically generated">
-            <a:extLst>
-              <a:ext uri="{FF2B5EF4-FFF2-40B4-BE49-F238E27FC236}">
-                <a16:creationId xmlns:a16="http://schemas.microsoft.com/office/drawing/2014/main" id="{072606C4-7E81-BECF-5AD7-D9AE730C208F}"/>
+          <p:cNvPr id="2" name="Picture 1">
+            <a:extLst>
+              <a:ext uri="{FF2B5EF4-FFF2-40B4-BE49-F238E27FC236}">
+                <a16:creationId xmlns:a16="http://schemas.microsoft.com/office/drawing/2014/main" id="{BDC6B69A-B9DF-7904-3A16-17B29A97AB56}"/>
               </a:ext>
             </a:extLst>
           </p:cNvPr>
@@ -9303,8 +9375,8 @@
         </p:blipFill>
         <p:spPr>
           <a:xfrm>
-            <a:off x="403830" y="266683"/>
-            <a:ext cx="11384340" cy="6324633"/>
+            <a:off x="394447" y="261470"/>
+            <a:ext cx="11403106" cy="6335059"/>
           </a:xfrm>
           <a:prstGeom prst="rect">
             <a:avLst/>
@@ -9341,6 +9413,156 @@
           <a:chExt cx="0" cy="0"/>
         </a:xfrm>
       </p:grpSpPr>
+      <p:pic>
+        <p:nvPicPr>
+          <p:cNvPr id="9" name="Picture 8" descr="A graph showing different colored lines&#10;&#10;Description automatically generated">
+            <a:extLst>
+              <a:ext uri="{FF2B5EF4-FFF2-40B4-BE49-F238E27FC236}">
+                <a16:creationId xmlns:a16="http://schemas.microsoft.com/office/drawing/2014/main" id="{6B76795C-3A41-D845-1059-B4BBD20B3BBF}"/>
+              </a:ext>
+            </a:extLst>
+          </p:cNvPr>
+          <p:cNvPicPr>
+            <a:picLocks noChangeAspect="1"/>
+          </p:cNvPicPr>
+          <p:nvPr/>
+        </p:nvPicPr>
+        <p:blipFill>
+          <a:blip r:embed="rId2"/>
+          <a:stretch>
+            <a:fillRect/>
+          </a:stretch>
+        </p:blipFill>
+        <p:spPr>
+          <a:xfrm>
+            <a:off x="461010" y="298450"/>
+            <a:ext cx="11269980" cy="6261100"/>
+          </a:xfrm>
+          <a:prstGeom prst="rect">
+            <a:avLst/>
+          </a:prstGeom>
+        </p:spPr>
+      </p:pic>
+    </p:spTree>
+    <p:extLst>
+      <p:ext uri="{BB962C8B-B14F-4D97-AF65-F5344CB8AC3E}">
+        <p14:creationId xmlns:p14="http://schemas.microsoft.com/office/powerpoint/2010/main" val="3751274947"/>
+      </p:ext>
+    </p:extLst>
+  </p:cSld>
+  <p:clrMapOvr>
+    <a:masterClrMapping/>
+  </p:clrMapOvr>
+</p:sld>
+</file>
+
+<file path=ppt/slides/slide18.xml><?xml version="1.0" encoding="utf-8"?>
+<p:sld xmlns:a="http://schemas.openxmlformats.org/drawingml/2006/main" xmlns:r="http://schemas.openxmlformats.org/officeDocument/2006/relationships" xmlns:p="http://schemas.openxmlformats.org/presentationml/2006/main">
+  <p:cSld>
+    <p:spTree>
+      <p:nvGrpSpPr>
+        <p:cNvPr id="1" name=""/>
+        <p:cNvGrpSpPr/>
+        <p:nvPr/>
+      </p:nvGrpSpPr>
+      <p:grpSpPr>
+        <a:xfrm>
+          <a:off x="0" y="0"/>
+          <a:ext cx="0" cy="0"/>
+          <a:chOff x="0" y="0"/>
+          <a:chExt cx="0" cy="0"/>
+        </a:xfrm>
+      </p:grpSpPr>
+      <p:pic>
+        <p:nvPicPr>
+          <p:cNvPr id="4" name="Picture 3">
+            <a:extLst>
+              <a:ext uri="{FF2B5EF4-FFF2-40B4-BE49-F238E27FC236}">
+                <a16:creationId xmlns:a16="http://schemas.microsoft.com/office/drawing/2014/main" id="{C9429CBE-7422-29F2-FD09-923F35F300F5}"/>
+              </a:ext>
+            </a:extLst>
+          </p:cNvPr>
+          <p:cNvPicPr>
+            <a:picLocks noChangeAspect="1"/>
+          </p:cNvPicPr>
+          <p:nvPr/>
+        </p:nvPicPr>
+        <p:blipFill>
+          <a:blip r:embed="rId2"/>
+          <a:stretch>
+            <a:fillRect/>
+          </a:stretch>
+        </p:blipFill>
+        <p:spPr>
+          <a:xfrm>
+            <a:off x="148046" y="1304731"/>
+            <a:ext cx="5947954" cy="4248538"/>
+          </a:xfrm>
+          <a:prstGeom prst="rect">
+            <a:avLst/>
+          </a:prstGeom>
+        </p:spPr>
+      </p:pic>
+      <p:pic>
+        <p:nvPicPr>
+          <p:cNvPr id="5" name="Picture 4">
+            <a:extLst>
+              <a:ext uri="{FF2B5EF4-FFF2-40B4-BE49-F238E27FC236}">
+                <a16:creationId xmlns:a16="http://schemas.microsoft.com/office/drawing/2014/main" id="{0C65F3B3-E7DF-488D-A940-832F80213416}"/>
+              </a:ext>
+            </a:extLst>
+          </p:cNvPr>
+          <p:cNvPicPr>
+            <a:picLocks noChangeAspect="1"/>
+          </p:cNvPicPr>
+          <p:nvPr/>
+        </p:nvPicPr>
+        <p:blipFill>
+          <a:blip r:embed="rId3"/>
+          <a:stretch>
+            <a:fillRect/>
+          </a:stretch>
+        </p:blipFill>
+        <p:spPr>
+          <a:xfrm>
+            <a:off x="6095999" y="1304729"/>
+            <a:ext cx="5947955" cy="4248540"/>
+          </a:xfrm>
+          <a:prstGeom prst="rect">
+            <a:avLst/>
+          </a:prstGeom>
+        </p:spPr>
+      </p:pic>
+    </p:spTree>
+    <p:extLst>
+      <p:ext uri="{BB962C8B-B14F-4D97-AF65-F5344CB8AC3E}">
+        <p14:creationId xmlns:p14="http://schemas.microsoft.com/office/powerpoint/2010/main" val="1353151747"/>
+      </p:ext>
+    </p:extLst>
+  </p:cSld>
+  <p:clrMapOvr>
+    <a:masterClrMapping/>
+  </p:clrMapOvr>
+</p:sld>
+</file>
+
+<file path=ppt/slides/slide19.xml><?xml version="1.0" encoding="utf-8"?>
+<p:sld xmlns:a="http://schemas.openxmlformats.org/drawingml/2006/main" xmlns:r="http://schemas.openxmlformats.org/officeDocument/2006/relationships" xmlns:p="http://schemas.openxmlformats.org/presentationml/2006/main">
+  <p:cSld>
+    <p:spTree>
+      <p:nvGrpSpPr>
+        <p:cNvPr id="1" name=""/>
+        <p:cNvGrpSpPr/>
+        <p:nvPr/>
+      </p:nvGrpSpPr>
+      <p:grpSpPr>
+        <a:xfrm>
+          <a:off x="0" y="0"/>
+          <a:ext cx="0" cy="0"/>
+          <a:chOff x="0" y="0"/>
+          <a:chExt cx="0" cy="0"/>
+        </a:xfrm>
+      </p:grpSpPr>
       <p:sp>
         <p:nvSpPr>
           <p:cNvPr id="2" name="Title 1">
@@ -9389,6 +9611,12 @@
         <p:txBody>
           <a:bodyPr/>
           <a:lstStyle/>
+          <a:p>
+            <a:r>
+              <a:rPr lang="en-US" dirty="0"/>
+              <a:t>The PIERS data do not include empty haul</a:t>
+            </a:r>
+          </a:p>
           <a:p>
             <a:r>
               <a:rPr lang="en-US" dirty="0"/>
@@ -9483,13 +9711,7 @@
           <a:p>
             <a:r>
               <a:rPr lang="en-US" dirty="0"/>
-              <a:t>Cooperative agreements between maritime freight carriers</a:t>
-            </a:r>
-          </a:p>
-          <a:p>
-            <a:r>
-              <a:rPr lang="en-US" dirty="0"/>
-              <a:t>Allies share capacity </a:t>
+              <a:t>Cooperative sharing agreements between maritime freight carriers</a:t>
             </a:r>
           </a:p>
           <a:p>
@@ -9503,6 +9725,13 @@
             <a:r>
               <a:rPr lang="en-US" dirty="0"/>
               <a:t>OCAs allow carriers to offer additional services (e.g., additional lanes) and more efficiently allocate capacity.</a:t>
+            </a:r>
+          </a:p>
+          <a:p>
+            <a:pPr lvl="1"/>
+            <a:r>
+              <a:rPr lang="en-US" dirty="0"/>
+              <a:t>Carriers can utilize larger ships by filling volume from other carriers.</a:t>
             </a:r>
           </a:p>
           <a:p>
@@ -9527,6 +9756,119 @@
     <p:extLst>
       <p:ext uri="{BB962C8B-B14F-4D97-AF65-F5344CB8AC3E}">
         <p14:creationId xmlns:p14="http://schemas.microsoft.com/office/powerpoint/2010/main" val="1623064167"/>
+      </p:ext>
+    </p:extLst>
+  </p:cSld>
+  <p:clrMapOvr>
+    <a:masterClrMapping/>
+  </p:clrMapOvr>
+</p:sld>
+</file>
+
+<file path=ppt/slides/slide20.xml><?xml version="1.0" encoding="utf-8"?>
+<p:sld xmlns:a="http://schemas.openxmlformats.org/drawingml/2006/main" xmlns:r="http://schemas.openxmlformats.org/officeDocument/2006/relationships" xmlns:p="http://schemas.openxmlformats.org/presentationml/2006/main">
+  <p:cSld>
+    <p:spTree>
+      <p:nvGrpSpPr>
+        <p:cNvPr id="1" name=""/>
+        <p:cNvGrpSpPr/>
+        <p:nvPr/>
+      </p:nvGrpSpPr>
+      <p:grpSpPr>
+        <a:xfrm>
+          <a:off x="0" y="0"/>
+          <a:ext cx="0" cy="0"/>
+          <a:chOff x="0" y="0"/>
+          <a:chExt cx="0" cy="0"/>
+        </a:xfrm>
+      </p:grpSpPr>
+      <p:sp>
+        <p:nvSpPr>
+          <p:cNvPr id="2" name="Title 1">
+            <a:extLst>
+              <a:ext uri="{FF2B5EF4-FFF2-40B4-BE49-F238E27FC236}">
+                <a16:creationId xmlns:a16="http://schemas.microsoft.com/office/drawing/2014/main" id="{851E7B48-98AC-7B25-CB3D-8CBBC598C220}"/>
+              </a:ext>
+            </a:extLst>
+          </p:cNvPr>
+          <p:cNvSpPr>
+            <a:spLocks noGrp="1"/>
+          </p:cNvSpPr>
+          <p:nvPr>
+            <p:ph type="title"/>
+          </p:nvPr>
+        </p:nvSpPr>
+        <p:spPr/>
+        <p:txBody>
+          <a:bodyPr/>
+          <a:lstStyle/>
+          <a:p>
+            <a:r>
+              <a:rPr lang="en-US" dirty="0"/>
+              <a:t>Concluding Remarks</a:t>
+            </a:r>
+          </a:p>
+        </p:txBody>
+      </p:sp>
+      <p:sp>
+        <p:nvSpPr>
+          <p:cNvPr id="3" name="Content Placeholder 2">
+            <a:extLst>
+              <a:ext uri="{FF2B5EF4-FFF2-40B4-BE49-F238E27FC236}">
+                <a16:creationId xmlns:a16="http://schemas.microsoft.com/office/drawing/2014/main" id="{8AD0A0AA-0740-6721-568D-C75B7993EC59}"/>
+              </a:ext>
+            </a:extLst>
+          </p:cNvPr>
+          <p:cNvSpPr>
+            <a:spLocks noGrp="1"/>
+          </p:cNvSpPr>
+          <p:nvPr>
+            <p:ph idx="1"/>
+          </p:nvPr>
+        </p:nvSpPr>
+        <p:spPr/>
+        <p:txBody>
+          <a:bodyPr/>
+          <a:lstStyle/>
+          <a:p>
+            <a:r>
+              <a:rPr lang="en-US" dirty="0"/>
+              <a:t>Alliance utilization varies over time and across lanes</a:t>
+            </a:r>
+          </a:p>
+          <a:p>
+            <a:r>
+              <a:rPr lang="en-US" dirty="0"/>
+              <a:t>Impacts on producers depend on utilization</a:t>
+            </a:r>
+          </a:p>
+          <a:p>
+            <a:r>
+              <a:rPr lang="en-US" dirty="0"/>
+              <a:t>Study results re: US ag producers expected this fall</a:t>
+            </a:r>
+          </a:p>
+          <a:p>
+            <a:r>
+              <a:rPr lang="en-US" dirty="0"/>
+              <a:t>Questions and comments welcome!</a:t>
+            </a:r>
+          </a:p>
+          <a:p>
+            <a:pPr marL="0" indent="0" algn="ctr">
+              <a:buNone/>
+            </a:pPr>
+            <a:r>
+              <a:rPr lang="en-US" dirty="0"/>
+              <a:t>adam.wilson1@wsu.edu</a:t>
+            </a:r>
+          </a:p>
+        </p:txBody>
+      </p:sp>
+    </p:spTree>
+    <p:extLst>
+      <p:ext uri="{BB962C8B-B14F-4D97-AF65-F5344CB8AC3E}">
+        <p14:creationId xmlns:p14="http://schemas.microsoft.com/office/powerpoint/2010/main" val="3929261373"/>
       </p:ext>
     </p:extLst>
   </p:cSld>
@@ -9684,79 +10026,40 @@
           <a:chExt cx="0" cy="0"/>
         </a:xfrm>
       </p:grpSpPr>
-      <p:sp>
-        <p:nvSpPr>
-          <p:cNvPr id="2" name="Title 1">
-            <a:extLst>
-              <a:ext uri="{FF2B5EF4-FFF2-40B4-BE49-F238E27FC236}">
-                <a16:creationId xmlns:a16="http://schemas.microsoft.com/office/drawing/2014/main" id="{DA904277-4230-28CD-0D12-B6D55F85195D}"/>
-              </a:ext>
-            </a:extLst>
-          </p:cNvPr>
-          <p:cNvSpPr>
-            <a:spLocks noGrp="1"/>
-          </p:cNvSpPr>
-          <p:nvPr>
-            <p:ph type="title"/>
-          </p:nvPr>
-        </p:nvSpPr>
-        <p:spPr/>
-        <p:txBody>
-          <a:bodyPr/>
-          <a:lstStyle/>
-          <a:p>
-            <a:r>
-              <a:rPr lang="en-US" dirty="0"/>
-              <a:t>Do OCAs Reduce Competition?</a:t>
-            </a:r>
-          </a:p>
-        </p:txBody>
-      </p:sp>
-      <p:sp>
-        <p:nvSpPr>
-          <p:cNvPr id="3" name="Content Placeholder 2">
-            <a:extLst>
-              <a:ext uri="{FF2B5EF4-FFF2-40B4-BE49-F238E27FC236}">
-                <a16:creationId xmlns:a16="http://schemas.microsoft.com/office/drawing/2014/main" id="{17437E95-D6AF-30C6-F8BB-98A08C246D84}"/>
-              </a:ext>
-            </a:extLst>
-          </p:cNvPr>
-          <p:cNvSpPr>
-            <a:spLocks noGrp="1"/>
-          </p:cNvSpPr>
-          <p:nvPr>
-            <p:ph idx="1"/>
-          </p:nvPr>
-        </p:nvSpPr>
-        <p:spPr/>
-        <p:txBody>
-          <a:bodyPr/>
-          <a:lstStyle/>
-          <a:p>
-            <a:r>
-              <a:rPr lang="en-US" dirty="0"/>
-              <a:t>Carriers argue that the increased efficiencies help keep costs down and allow them to provide better service.</a:t>
-            </a:r>
-          </a:p>
-          <a:p>
-            <a:r>
-              <a:rPr lang="en-US" dirty="0"/>
-              <a:t>Shippers and regulating bodies are concerned that OCAs give carriers too much market power</a:t>
-            </a:r>
-          </a:p>
-          <a:p>
-            <a:pPr lvl="1"/>
-            <a:r>
-              <a:rPr lang="en-US" dirty="0"/>
-              <a:t>Anecdotal reports from US producers include high prices, reductions in frequency of service, and reduced delivery windows</a:t>
-            </a:r>
-          </a:p>
-        </p:txBody>
-      </p:sp>
+      <p:pic>
+        <p:nvPicPr>
+          <p:cNvPr id="6" name="Picture 5" descr="A chart of different colored squares&#10;&#10;Description automatically generated">
+            <a:extLst>
+              <a:ext uri="{FF2B5EF4-FFF2-40B4-BE49-F238E27FC236}">
+                <a16:creationId xmlns:a16="http://schemas.microsoft.com/office/drawing/2014/main" id="{52488248-A3C7-CD22-E7C3-C518EE077DE3}"/>
+              </a:ext>
+            </a:extLst>
+          </p:cNvPr>
+          <p:cNvPicPr>
+            <a:picLocks noChangeAspect="1"/>
+          </p:cNvPicPr>
+          <p:nvPr/>
+        </p:nvPicPr>
+        <p:blipFill>
+          <a:blip r:embed="rId2"/>
+          <a:stretch>
+            <a:fillRect/>
+          </a:stretch>
+        </p:blipFill>
+        <p:spPr>
+          <a:xfrm>
+            <a:off x="406549" y="268194"/>
+            <a:ext cx="11378902" cy="6321612"/>
+          </a:xfrm>
+          <a:prstGeom prst="rect">
+            <a:avLst/>
+          </a:prstGeom>
+        </p:spPr>
+      </p:pic>
     </p:spTree>
     <p:extLst>
       <p:ext uri="{BB962C8B-B14F-4D97-AF65-F5344CB8AC3E}">
-        <p14:creationId xmlns:p14="http://schemas.microsoft.com/office/powerpoint/2010/main" val="1861624256"/>
+        <p14:creationId xmlns:p14="http://schemas.microsoft.com/office/powerpoint/2010/main" val="1585077462"/>
       </p:ext>
     </p:extLst>
   </p:cSld>
@@ -9783,107 +10086,40 @@
           <a:chExt cx="0" cy="0"/>
         </a:xfrm>
       </p:grpSpPr>
-      <p:sp>
-        <p:nvSpPr>
-          <p:cNvPr id="2" name="Title 1">
-            <a:extLst>
-              <a:ext uri="{FF2B5EF4-FFF2-40B4-BE49-F238E27FC236}">
-                <a16:creationId xmlns:a16="http://schemas.microsoft.com/office/drawing/2014/main" id="{22965314-E236-98C6-DF03-DB40AAA03F99}"/>
-              </a:ext>
-            </a:extLst>
-          </p:cNvPr>
-          <p:cNvSpPr>
-            <a:spLocks noGrp="1"/>
-          </p:cNvSpPr>
-          <p:nvPr>
-            <p:ph type="title"/>
-          </p:nvPr>
-        </p:nvSpPr>
-        <p:spPr/>
-        <p:txBody>
-          <a:bodyPr/>
-          <a:lstStyle/>
-          <a:p>
-            <a:r>
-              <a:rPr lang="en-US" dirty="0"/>
-              <a:t>Antitrust Exemptions</a:t>
-            </a:r>
-          </a:p>
-        </p:txBody>
-      </p:sp>
-      <p:sp>
-        <p:nvSpPr>
-          <p:cNvPr id="3" name="Content Placeholder 2">
-            <a:extLst>
-              <a:ext uri="{FF2B5EF4-FFF2-40B4-BE49-F238E27FC236}">
-                <a16:creationId xmlns:a16="http://schemas.microsoft.com/office/drawing/2014/main" id="{3D3FFD83-0F9B-0B2F-3704-478038684AD5}"/>
-              </a:ext>
-            </a:extLst>
-          </p:cNvPr>
-          <p:cNvSpPr>
-            <a:spLocks noGrp="1"/>
-          </p:cNvSpPr>
-          <p:nvPr>
-            <p:ph idx="1"/>
-          </p:nvPr>
-        </p:nvSpPr>
-        <p:spPr/>
-        <p:txBody>
-          <a:bodyPr/>
-          <a:lstStyle/>
-          <a:p>
-            <a:r>
-              <a:rPr lang="en-US" dirty="0"/>
-              <a:t>Both US and EU have historically agreed that OCAs are a net good:</a:t>
-            </a:r>
-          </a:p>
-          <a:p>
-            <a:pPr lvl="1"/>
-            <a:r>
-              <a:rPr lang="en-US" dirty="0"/>
-              <a:t>European Union’s Consortia Bloc Exemption Regulation (EU CBER) exempted OCAs from most EU antitrust rules</a:t>
-            </a:r>
-          </a:p>
-          <a:p>
-            <a:pPr lvl="1"/>
-            <a:r>
-              <a:rPr lang="en-US" dirty="0"/>
-              <a:t>US regulates OCAs via the Federal Maritime Commission (FMC) rather than applying traditional antitrust regs </a:t>
-            </a:r>
-          </a:p>
-          <a:p>
-            <a:r>
-              <a:rPr lang="en-US" dirty="0"/>
-              <a:t>This tide may be changing</a:t>
-            </a:r>
-          </a:p>
-          <a:p>
-            <a:pPr lvl="1"/>
-            <a:r>
-              <a:rPr lang="en-US" dirty="0"/>
-              <a:t>EU Consortia Block Exemption Regulation expired on 25 April 2024</a:t>
-            </a:r>
-          </a:p>
-          <a:p>
-            <a:pPr lvl="1"/>
-            <a:r>
-              <a:rPr lang="en-US" dirty="0"/>
-              <a:t>US Congress is considering similar regulation changes</a:t>
-            </a:r>
-          </a:p>
-          <a:p>
-            <a:pPr lvl="2"/>
-            <a:r>
-              <a:rPr lang="en-US" dirty="0"/>
-              <a:t>e.g. the Ocean Shipping Antitrust Enforcement Act </a:t>
-            </a:r>
-          </a:p>
-        </p:txBody>
-      </p:sp>
+      <p:pic>
+        <p:nvPicPr>
+          <p:cNvPr id="6" name="Picture 5" descr="A chart of different colored squares&#10;&#10;Description automatically generated">
+            <a:extLst>
+              <a:ext uri="{FF2B5EF4-FFF2-40B4-BE49-F238E27FC236}">
+                <a16:creationId xmlns:a16="http://schemas.microsoft.com/office/drawing/2014/main" id="{E33BB4B4-1BB2-FD3D-9516-5A143F0A0FEF}"/>
+              </a:ext>
+            </a:extLst>
+          </p:cNvPr>
+          <p:cNvPicPr>
+            <a:picLocks noChangeAspect="1"/>
+          </p:cNvPicPr>
+          <p:nvPr/>
+        </p:nvPicPr>
+        <p:blipFill>
+          <a:blip r:embed="rId2"/>
+          <a:stretch>
+            <a:fillRect/>
+          </a:stretch>
+        </p:blipFill>
+        <p:spPr>
+          <a:xfrm>
+            <a:off x="430754" y="281641"/>
+            <a:ext cx="11330492" cy="6294718"/>
+          </a:xfrm>
+          <a:prstGeom prst="rect">
+            <a:avLst/>
+          </a:prstGeom>
+        </p:spPr>
+      </p:pic>
     </p:spTree>
     <p:extLst>
       <p:ext uri="{BB962C8B-B14F-4D97-AF65-F5344CB8AC3E}">
-        <p14:creationId xmlns:p14="http://schemas.microsoft.com/office/powerpoint/2010/main" val="2133206924"/>
+        <p14:creationId xmlns:p14="http://schemas.microsoft.com/office/powerpoint/2010/main" val="2094747406"/>
       </p:ext>
     </p:extLst>
   </p:cSld>
@@ -9915,7 +10151,7 @@
           <p:cNvPr id="2" name="Title 1">
             <a:extLst>
               <a:ext uri="{FF2B5EF4-FFF2-40B4-BE49-F238E27FC236}">
-                <a16:creationId xmlns:a16="http://schemas.microsoft.com/office/drawing/2014/main" id="{00F7FCF6-A5A0-B02A-783E-2193C1BFCF7E}"/>
+                <a16:creationId xmlns:a16="http://schemas.microsoft.com/office/drawing/2014/main" id="{DA904277-4230-28CD-0D12-B6D55F85195D}"/>
               </a:ext>
             </a:extLst>
           </p:cNvPr>
@@ -9926,16 +10162,19 @@
             <p:ph type="title"/>
           </p:nvPr>
         </p:nvSpPr>
-        <p:spPr/>
+        <p:spPr>
+          <a:xfrm>
+            <a:off x="550862" y="549275"/>
+            <a:ext cx="11091600" cy="971412"/>
+          </a:xfrm>
+        </p:spPr>
         <p:txBody>
-          <a:bodyPr>
-            <a:normAutofit/>
-          </a:bodyPr>
+          <a:bodyPr/>
           <a:lstStyle/>
           <a:p>
             <a:r>
               <a:rPr lang="en-US" dirty="0"/>
-              <a:t>WSU Transportation Research Group</a:t>
+              <a:t>Do OCAs Reduce Competition?</a:t>
             </a:r>
           </a:p>
         </p:txBody>
@@ -9945,7 +10184,7 @@
           <p:cNvPr id="3" name="Content Placeholder 2">
             <a:extLst>
               <a:ext uri="{FF2B5EF4-FFF2-40B4-BE49-F238E27FC236}">
-                <a16:creationId xmlns:a16="http://schemas.microsoft.com/office/drawing/2014/main" id="{A16A1964-752C-2A09-5211-DCC330769732}"/>
+                <a16:creationId xmlns:a16="http://schemas.microsoft.com/office/drawing/2014/main" id="{17437E95-D6AF-30C6-F8BB-98A08C246D84}"/>
               </a:ext>
             </a:extLst>
           </p:cNvPr>
@@ -9956,118 +10195,60 @@
             <p:ph idx="1"/>
           </p:nvPr>
         </p:nvSpPr>
-        <p:spPr/>
+        <p:spPr>
+          <a:xfrm>
+            <a:off x="552188" y="1795147"/>
+            <a:ext cx="11090274" cy="4367114"/>
+          </a:xfrm>
+        </p:spPr>
         <p:txBody>
           <a:bodyPr/>
           <a:lstStyle/>
           <a:p>
             <a:r>
-              <a:rPr lang="en-US" dirty="0">
-                <a:solidFill>
-                  <a:schemeClr val="tx1">
-                    <a:alpha val="85000"/>
-                  </a:schemeClr>
-                </a:solidFill>
-              </a:rPr>
-              <a:t>USDA Grant</a:t>
+              <a:rPr lang="en-US" dirty="0"/>
+              <a:t>Carriers argue that the increased efficiencies help keep costs down and allow them to provide better service.</a:t>
+            </a:r>
+          </a:p>
+          <a:p>
+            <a:r>
+              <a:rPr lang="en-US" dirty="0"/>
+              <a:t>Shippers and regulating bodies are concerned that OCAs give carriers too much market power</a:t>
             </a:r>
           </a:p>
           <a:p>
             <a:pPr lvl="1"/>
             <a:r>
               <a:rPr lang="en-US" dirty="0"/>
-              <a:t>This research is supported by the U.S. Department of Agriculture, Agricultural Marketing Service. The findings and conclusions in this publication are those of the authors and should not be construed to represent any official USDA or U.S. Government determination or policy.</a:t>
-            </a:r>
-            <a:endParaRPr lang="en-US" dirty="0">
-              <a:solidFill>
-                <a:schemeClr val="tx1">
-                  <a:alpha val="85000"/>
-                </a:schemeClr>
-              </a:solidFill>
-            </a:endParaRPr>
-          </a:p>
-          <a:p>
-            <a:r>
-              <a:rPr lang="en-US" dirty="0">
-                <a:solidFill>
-                  <a:schemeClr val="tx1">
-                    <a:alpha val="85000"/>
-                  </a:schemeClr>
-                </a:solidFill>
-              </a:rPr>
-              <a:t>Investigating impacts </a:t>
-            </a:r>
+              <a:t>Anecdotal reports from US producers include high prices, reductions in frequency of service, and reduced delivery windows</a:t>
+            </a:r>
+          </a:p>
+          <a:p>
+            <a:pPr lvl="1"/>
             <a:r>
               <a:rPr lang="en-US" dirty="0"/>
-              <a:t>of OCAs on Containerized Ag Exports</a:t>
-            </a:r>
-            <a:endParaRPr lang="en-US" dirty="0">
-              <a:solidFill>
-                <a:schemeClr val="tx1">
-                  <a:alpha val="85000"/>
-                </a:schemeClr>
-              </a:solidFill>
-            </a:endParaRPr>
+              <a:t>Industry analysts point out that OCAs currently represent some ¾ of global capacity </a:t>
+            </a:r>
+          </a:p>
+          <a:p>
+            <a:r>
+              <a:rPr lang="en-US" dirty="0"/>
+              <a:t>OCAs have historically been exempt from antitrust regulation</a:t>
+            </a:r>
           </a:p>
           <a:p>
             <a:pPr lvl="1"/>
             <a:r>
-              <a:rPr lang="en-US" dirty="0">
-                <a:solidFill>
-                  <a:schemeClr val="tx1">
-                    <a:alpha val="85000"/>
-                  </a:schemeClr>
-                </a:solidFill>
-              </a:rPr>
-              <a:t>Price</a:t>
-            </a:r>
-          </a:p>
-          <a:p>
-            <a:pPr lvl="1"/>
-            <a:r>
-              <a:rPr lang="en-US" dirty="0">
-                <a:solidFill>
-                  <a:schemeClr val="tx1">
-                    <a:alpha val="85000"/>
-                  </a:schemeClr>
-                </a:solidFill>
-              </a:rPr>
-              <a:t>Quality of Service</a:t>
-            </a:r>
-          </a:p>
-          <a:p>
-            <a:pPr lvl="2"/>
-            <a:r>
-              <a:rPr lang="en-US" dirty="0">
-                <a:solidFill>
-                  <a:schemeClr val="tx1">
-                    <a:alpha val="85000"/>
-                  </a:schemeClr>
-                </a:solidFill>
-              </a:rPr>
-              <a:t>Service Frequency (number of voyages, total capacity)</a:t>
-            </a:r>
-          </a:p>
-          <a:p>
-            <a:pPr lvl="2"/>
-            <a:r>
               <a:rPr lang="en-US" dirty="0"/>
-              <a:t>Competitive Options (number of carriers servicing a given lane)</a:t>
-            </a:r>
-            <a:endParaRPr lang="en-US" dirty="0">
-              <a:solidFill>
-                <a:schemeClr val="tx1">
-                  <a:alpha val="85000"/>
-                </a:schemeClr>
-              </a:solidFill>
-            </a:endParaRPr>
+              <a:t>This tide may be changing: EU exemption expired in April, and US is investigating similar moves</a:t>
+            </a:r>
           </a:p>
         </p:txBody>
       </p:sp>
     </p:spTree>
     <p:extLst>
       <p:ext uri="{BB962C8B-B14F-4D97-AF65-F5344CB8AC3E}">
-        <p14:creationId xmlns:p14="http://schemas.microsoft.com/office/powerpoint/2010/main" val="3291558162"/>
+        <p14:creationId xmlns:p14="http://schemas.microsoft.com/office/powerpoint/2010/main" val="1861624256"/>
       </p:ext>
     </p:extLst>
   </p:cSld>
@@ -10099,7 +10280,7 @@
           <p:cNvPr id="2" name="Title 1">
             <a:extLst>
               <a:ext uri="{FF2B5EF4-FFF2-40B4-BE49-F238E27FC236}">
-                <a16:creationId xmlns:a16="http://schemas.microsoft.com/office/drawing/2014/main" id="{27E6CFF0-D9F3-AF5F-7929-8B88904CC5BF}"/>
+                <a16:creationId xmlns:a16="http://schemas.microsoft.com/office/drawing/2014/main" id="{00F7FCF6-A5A0-B02A-783E-2193C1BFCF7E}"/>
               </a:ext>
             </a:extLst>
           </p:cNvPr>
@@ -10110,19 +10291,16 @@
             <p:ph type="title"/>
           </p:nvPr>
         </p:nvSpPr>
-        <p:spPr>
-          <a:xfrm>
-            <a:off x="550862" y="549275"/>
-            <a:ext cx="11091600" cy="921716"/>
-          </a:xfrm>
-        </p:spPr>
+        <p:spPr/>
         <p:txBody>
-          <a:bodyPr/>
+          <a:bodyPr>
+            <a:normAutofit/>
+          </a:bodyPr>
           <a:lstStyle/>
           <a:p>
             <a:r>
               <a:rPr lang="en-US" dirty="0"/>
-              <a:t>Data Sets</a:t>
+              <a:t>WSU Transportation Research Group</a:t>
             </a:r>
           </a:p>
         </p:txBody>
@@ -10132,7 +10310,7 @@
           <p:cNvPr id="3" name="Content Placeholder 2">
             <a:extLst>
               <a:ext uri="{FF2B5EF4-FFF2-40B4-BE49-F238E27FC236}">
-                <a16:creationId xmlns:a16="http://schemas.microsoft.com/office/drawing/2014/main" id="{3C168641-2F2C-B26F-D8DD-3203CBD7147D}"/>
+                <a16:creationId xmlns:a16="http://schemas.microsoft.com/office/drawing/2014/main" id="{A16A1964-752C-2A09-5211-DCC330769732}"/>
               </a:ext>
             </a:extLst>
           </p:cNvPr>
@@ -10145,90 +10323,133 @@
         </p:nvSpPr>
         <p:spPr>
           <a:xfrm>
-            <a:off x="549537" y="1755391"/>
+            <a:off x="550864" y="1881275"/>
             <a:ext cx="11090274" cy="3979625"/>
           </a:xfrm>
         </p:spPr>
         <p:txBody>
           <a:bodyPr>
-            <a:normAutofit lnSpcReduction="10000"/>
+            <a:normAutofit fontScale="85000" lnSpcReduction="20000"/>
           </a:bodyPr>
           <a:lstStyle/>
           <a:p>
             <a:r>
+              <a:rPr lang="en-US" dirty="0">
+                <a:solidFill>
+                  <a:schemeClr val="tx1">
+                    <a:alpha val="85000"/>
+                  </a:schemeClr>
+                </a:solidFill>
+              </a:rPr>
+              <a:t>USDA Grant</a:t>
+            </a:r>
+          </a:p>
+          <a:p>
+            <a:pPr lvl="1"/>
+            <a:r>
               <a:rPr lang="en-US" dirty="0"/>
-              <a:t>S&amp;P </a:t>
-            </a:r>
-            <a:r>
-              <a:rPr lang="en-US" dirty="0" err="1"/>
-              <a:t>Global’s</a:t>
+              <a:t>This research is supported by the U.S. Department of Agriculture, Agricultural Marketing Service. The findings and conclusions in this publication are those of the authors and should not be construed to represent any official USDA or U.S. Government determination or policy.</a:t>
+            </a:r>
+            <a:endParaRPr lang="en-US" dirty="0">
+              <a:solidFill>
+                <a:schemeClr val="tx1">
+                  <a:alpha val="85000"/>
+                </a:schemeClr>
+              </a:solidFill>
+            </a:endParaRPr>
+          </a:p>
+          <a:p>
+            <a:r>
+              <a:rPr lang="en-US" dirty="0">
+                <a:solidFill>
+                  <a:schemeClr val="tx1">
+                    <a:alpha val="85000"/>
+                  </a:schemeClr>
+                </a:solidFill>
+              </a:rPr>
+              <a:t>Investigating impacts </a:t>
             </a:r>
             <a:r>
               <a:rPr lang="en-US" dirty="0"/>
-              <a:t> PIERS database</a:t>
-            </a:r>
+              <a:t>of OCAs on Containerized Ag Exports</a:t>
+            </a:r>
+            <a:endParaRPr lang="en-US" dirty="0">
+              <a:solidFill>
+                <a:schemeClr val="tx1">
+                  <a:alpha val="85000"/>
+                </a:schemeClr>
+              </a:solidFill>
+            </a:endParaRPr>
           </a:p>
           <a:p>
             <a:pPr lvl="1"/>
             <a:r>
+              <a:rPr lang="en-US" dirty="0">
+                <a:solidFill>
+                  <a:schemeClr val="tx1">
+                    <a:alpha val="85000"/>
+                  </a:schemeClr>
+                </a:solidFill>
+              </a:rPr>
+              <a:t>Price</a:t>
+            </a:r>
+          </a:p>
+          <a:p>
+            <a:pPr lvl="1"/>
+            <a:r>
+              <a:rPr lang="en-US" dirty="0">
+                <a:solidFill>
+                  <a:schemeClr val="tx1">
+                    <a:alpha val="85000"/>
+                  </a:schemeClr>
+                </a:solidFill>
+              </a:rPr>
+              <a:t>Quality of Service</a:t>
+            </a:r>
+          </a:p>
+          <a:p>
+            <a:pPr lvl="2"/>
+            <a:r>
+              <a:rPr lang="en-US" dirty="0">
+                <a:solidFill>
+                  <a:schemeClr val="tx1">
+                    <a:alpha val="85000"/>
+                  </a:schemeClr>
+                </a:solidFill>
+              </a:rPr>
+              <a:t>Service Frequency (number of voyages, total capacity)</a:t>
+            </a:r>
+          </a:p>
+          <a:p>
+            <a:pPr lvl="2"/>
+            <a:r>
               <a:rPr lang="en-US" dirty="0"/>
-              <a:t>Bill of Lading level data including volume, date, arrival and departure ports, commodity codes, vessel IDs (IMO codes), etc.</a:t>
+              <a:t>Competitive Options (number of carriers servicing a given lane)</a:t>
+            </a:r>
+          </a:p>
+          <a:p>
+            <a:r>
+              <a:rPr lang="en-US" dirty="0">
+                <a:solidFill>
+                  <a:schemeClr val="tx1">
+                    <a:alpha val="85000"/>
+                  </a:schemeClr>
+                </a:solidFill>
+              </a:rPr>
+              <a:t>Premise: Impacts of OCAs depend on how much carriers utilize the OCA </a:t>
             </a:r>
           </a:p>
           <a:p>
             <a:pPr lvl="1"/>
             <a:r>
-              <a:rPr lang="en-US" dirty="0"/>
-              <a:t>Dataset captures all maritime containerized freight bills processed by US Customs since 2005 </a:t>
-            </a:r>
-          </a:p>
-          <a:p>
-            <a:pPr lvl="1"/>
-            <a:r>
-              <a:rPr lang="en-US" dirty="0"/>
-              <a:t>~179M import bills, ~70M export bills</a:t>
-            </a:r>
-          </a:p>
-          <a:p>
-            <a:r>
-              <a:rPr lang="en-US" dirty="0"/>
-              <a:t>Alliance Membership Data</a:t>
-            </a:r>
-          </a:p>
-          <a:p>
-            <a:pPr lvl="1"/>
-            <a:r>
-              <a:rPr lang="en-US" dirty="0"/>
-              <a:t>Referencing the work of Port Economics, Management and Policy’s Theo </a:t>
-            </a:r>
-            <a:r>
-              <a:rPr lang="en-US" dirty="0" err="1"/>
-              <a:t>Notteboom</a:t>
-            </a:r>
-            <a:r>
-              <a:rPr lang="en-US" dirty="0"/>
-              <a:t> </a:t>
-            </a:r>
-          </a:p>
-          <a:p>
-            <a:r>
-              <a:rPr lang="en-US" dirty="0"/>
-              <a:t>Future analysis will include </a:t>
-            </a:r>
-            <a:r>
-              <a:rPr lang="en-US" dirty="0" err="1"/>
-              <a:t>Drewery’s</a:t>
-            </a:r>
-            <a:r>
-              <a:rPr lang="en-US" dirty="0"/>
-              <a:t> Container Insights price data</a:t>
-            </a:r>
-          </a:p>
-          <a:p>
-            <a:pPr lvl="1"/>
-            <a:r>
-              <a:rPr lang="en-US" dirty="0"/>
-              <a:t>Average prices per TEU for a given lane and month</a:t>
+              <a:rPr lang="en-US" dirty="0">
+                <a:solidFill>
+                  <a:schemeClr val="tx1">
+                    <a:alpha val="85000"/>
+                  </a:schemeClr>
+                </a:solidFill>
+              </a:rPr>
+              <a:t>To our knowledge, this has not been studied</a:t>
             </a:r>
           </a:p>
         </p:txBody>
@@ -10236,7 +10457,7 @@
     </p:spTree>
     <p:extLst>
       <p:ext uri="{BB962C8B-B14F-4D97-AF65-F5344CB8AC3E}">
-        <p14:creationId xmlns:p14="http://schemas.microsoft.com/office/powerpoint/2010/main" val="3328601177"/>
+        <p14:creationId xmlns:p14="http://schemas.microsoft.com/office/powerpoint/2010/main" val="3291558162"/>
       </p:ext>
     </p:extLst>
   </p:cSld>
@@ -10268,7 +10489,7 @@
           <p:cNvPr id="2" name="Title 1">
             <a:extLst>
               <a:ext uri="{FF2B5EF4-FFF2-40B4-BE49-F238E27FC236}">
-                <a16:creationId xmlns:a16="http://schemas.microsoft.com/office/drawing/2014/main" id="{1F1E5F77-54E7-5CCE-8DC8-8B127751AF3E}"/>
+                <a16:creationId xmlns:a16="http://schemas.microsoft.com/office/drawing/2014/main" id="{27E6CFF0-D9F3-AF5F-7929-8B88904CC5BF}"/>
               </a:ext>
             </a:extLst>
           </p:cNvPr>
@@ -10279,14 +10500,19 @@
             <p:ph type="title"/>
           </p:nvPr>
         </p:nvSpPr>
-        <p:spPr/>
+        <p:spPr>
+          <a:xfrm>
+            <a:off x="550862" y="549275"/>
+            <a:ext cx="11091600" cy="921716"/>
+          </a:xfrm>
+        </p:spPr>
         <p:txBody>
           <a:bodyPr/>
           <a:lstStyle/>
           <a:p>
             <a:r>
               <a:rPr lang="en-US" dirty="0"/>
-              <a:t>West Coast Exports	</a:t>
+              <a:t>Data Sets</a:t>
             </a:r>
           </a:p>
         </p:txBody>
@@ -10296,7 +10522,7 @@
           <p:cNvPr id="3" name="Content Placeholder 2">
             <a:extLst>
               <a:ext uri="{FF2B5EF4-FFF2-40B4-BE49-F238E27FC236}">
-                <a16:creationId xmlns:a16="http://schemas.microsoft.com/office/drawing/2014/main" id="{F14797B4-7159-0C1C-7514-D17F610840B4}"/>
+                <a16:creationId xmlns:a16="http://schemas.microsoft.com/office/drawing/2014/main" id="{3C168641-2F2C-B26F-D8DD-3203CBD7147D}"/>
               </a:ext>
             </a:extLst>
           </p:cNvPr>
@@ -10307,14 +10533,99 @@
             <p:ph idx="1"/>
           </p:nvPr>
         </p:nvSpPr>
-        <p:spPr/>
+        <p:spPr>
+          <a:xfrm>
+            <a:off x="549537" y="1755391"/>
+            <a:ext cx="11090274" cy="4404109"/>
+          </a:xfrm>
+        </p:spPr>
         <p:txBody>
-          <a:bodyPr/>
+          <a:bodyPr>
+            <a:normAutofit lnSpcReduction="10000"/>
+          </a:bodyPr>
           <a:lstStyle/>
           <a:p>
             <a:r>
               <a:rPr lang="en-US" dirty="0"/>
-              <a:t>Since we are initially focused on the impacts of OCAs on US producers and this is PNREC, this presentation presents data from US West Coast ports only.</a:t>
+              <a:t>S&amp;P </a:t>
+            </a:r>
+            <a:r>
+              <a:rPr lang="en-US" dirty="0" err="1"/>
+              <a:t>Global’s</a:t>
+            </a:r>
+            <a:r>
+              <a:rPr lang="en-US" dirty="0"/>
+              <a:t> PIERS database</a:t>
+            </a:r>
+          </a:p>
+          <a:p>
+            <a:pPr lvl="1"/>
+            <a:r>
+              <a:rPr lang="en-US" dirty="0"/>
+              <a:t>Bill of Lading level data including volume, date, arrival and departure ports, commodity codes, vessel IDs (IMO codes), etc.</a:t>
+            </a:r>
+          </a:p>
+          <a:p>
+            <a:pPr lvl="1"/>
+            <a:r>
+              <a:rPr lang="en-US" dirty="0"/>
+              <a:t>Dataset captures all maritime containerized freight bills processed by US Customs since 2005 </a:t>
+            </a:r>
+          </a:p>
+          <a:p>
+            <a:pPr lvl="1"/>
+            <a:r>
+              <a:rPr lang="en-US" dirty="0"/>
+              <a:t>Excludes trade via air, truck, rail, Canadian and Mexican borders, etc.</a:t>
+            </a:r>
+          </a:p>
+          <a:p>
+            <a:pPr lvl="1"/>
+            <a:r>
+              <a:rPr lang="en-US" dirty="0"/>
+              <a:t>~179M import bills, ~70M export bills</a:t>
+            </a:r>
+          </a:p>
+          <a:p>
+            <a:r>
+              <a:rPr lang="en-US" dirty="0"/>
+              <a:t>Alliance Membership Data</a:t>
+            </a:r>
+          </a:p>
+          <a:p>
+            <a:pPr lvl="1"/>
+            <a:r>
+              <a:rPr lang="en-US" dirty="0"/>
+              <a:t>Referencing the work of Port Economics, Management and Policy’s Theo </a:t>
+            </a:r>
+            <a:r>
+              <a:rPr lang="en-US" dirty="0" err="1"/>
+              <a:t>Notteboom</a:t>
+            </a:r>
+            <a:r>
+              <a:rPr lang="en-US" dirty="0"/>
+              <a:t> </a:t>
+            </a:r>
+          </a:p>
+          <a:p>
+            <a:r>
+              <a:rPr lang="en-US" dirty="0"/>
+              <a:t>Future analysis will include </a:t>
+            </a:r>
+            <a:r>
+              <a:rPr lang="en-US" dirty="0" err="1"/>
+              <a:t>Drewery’s</a:t>
+            </a:r>
+            <a:r>
+              <a:rPr lang="en-US" dirty="0"/>
+              <a:t> Container Insights price data</a:t>
+            </a:r>
+          </a:p>
+          <a:p>
+            <a:pPr lvl="1"/>
+            <a:r>
+              <a:rPr lang="en-US" dirty="0"/>
+              <a:t>Average prices per TEU for a given lane and month</a:t>
             </a:r>
           </a:p>
         </p:txBody>
@@ -10322,7 +10633,7 @@
     </p:spTree>
     <p:extLst>
       <p:ext uri="{BB962C8B-B14F-4D97-AF65-F5344CB8AC3E}">
-        <p14:creationId xmlns:p14="http://schemas.microsoft.com/office/powerpoint/2010/main" val="1438172883"/>
+        <p14:creationId xmlns:p14="http://schemas.microsoft.com/office/powerpoint/2010/main" val="3328601177"/>
       </p:ext>
     </p:extLst>
   </p:cSld>
@@ -10349,40 +10660,66 @@
           <a:chExt cx="0" cy="0"/>
         </a:xfrm>
       </p:grpSpPr>
-      <p:pic>
-        <p:nvPicPr>
-          <p:cNvPr id="5" name="Picture 4" descr="A graph of different colored squares&#10;&#10;Description automatically generated">
-            <a:extLst>
-              <a:ext uri="{FF2B5EF4-FFF2-40B4-BE49-F238E27FC236}">
-                <a16:creationId xmlns:a16="http://schemas.microsoft.com/office/drawing/2014/main" id="{CBC16A60-BF90-9970-FD32-3E1DAB180CC0}"/>
-              </a:ext>
-            </a:extLst>
-          </p:cNvPr>
-          <p:cNvPicPr>
-            <a:picLocks noChangeAspect="1"/>
-          </p:cNvPicPr>
-          <p:nvPr/>
-        </p:nvPicPr>
-        <p:blipFill>
-          <a:blip r:embed="rId2"/>
-          <a:stretch>
-            <a:fillRect/>
-          </a:stretch>
-        </p:blipFill>
-        <p:spPr>
-          <a:xfrm>
-            <a:off x="392353" y="260307"/>
-            <a:ext cx="11407294" cy="6337386"/>
-          </a:xfrm>
-          <a:prstGeom prst="rect">
-            <a:avLst/>
-          </a:prstGeom>
-        </p:spPr>
-      </p:pic>
+      <p:sp>
+        <p:nvSpPr>
+          <p:cNvPr id="2" name="Title 1">
+            <a:extLst>
+              <a:ext uri="{FF2B5EF4-FFF2-40B4-BE49-F238E27FC236}">
+                <a16:creationId xmlns:a16="http://schemas.microsoft.com/office/drawing/2014/main" id="{1F1E5F77-54E7-5CCE-8DC8-8B127751AF3E}"/>
+              </a:ext>
+            </a:extLst>
+          </p:cNvPr>
+          <p:cNvSpPr>
+            <a:spLocks noGrp="1"/>
+          </p:cNvSpPr>
+          <p:nvPr>
+            <p:ph type="title"/>
+          </p:nvPr>
+        </p:nvSpPr>
+        <p:spPr/>
+        <p:txBody>
+          <a:bodyPr/>
+          <a:lstStyle/>
+          <a:p>
+            <a:r>
+              <a:rPr lang="en-US" dirty="0"/>
+              <a:t>West Coast Exports	</a:t>
+            </a:r>
+          </a:p>
+        </p:txBody>
+      </p:sp>
+      <p:sp>
+        <p:nvSpPr>
+          <p:cNvPr id="3" name="Content Placeholder 2">
+            <a:extLst>
+              <a:ext uri="{FF2B5EF4-FFF2-40B4-BE49-F238E27FC236}">
+                <a16:creationId xmlns:a16="http://schemas.microsoft.com/office/drawing/2014/main" id="{F14797B4-7159-0C1C-7514-D17F610840B4}"/>
+              </a:ext>
+            </a:extLst>
+          </p:cNvPr>
+          <p:cNvSpPr>
+            <a:spLocks noGrp="1"/>
+          </p:cNvSpPr>
+          <p:nvPr>
+            <p:ph idx="1"/>
+          </p:nvPr>
+        </p:nvSpPr>
+        <p:spPr/>
+        <p:txBody>
+          <a:bodyPr/>
+          <a:lstStyle/>
+          <a:p>
+            <a:r>
+              <a:rPr lang="en-US" dirty="0"/>
+              <a:t>Since we are initially focused on the impacts of OCAs on US producers and this is PNREC, this presentation presents data from US West Coast ports only.</a:t>
+            </a:r>
+          </a:p>
+        </p:txBody>
+      </p:sp>
     </p:spTree>
     <p:extLst>
       <p:ext uri="{BB962C8B-B14F-4D97-AF65-F5344CB8AC3E}">
-        <p14:creationId xmlns:p14="http://schemas.microsoft.com/office/powerpoint/2010/main" val="1585077462"/>
+        <p14:creationId xmlns:p14="http://schemas.microsoft.com/office/powerpoint/2010/main" val="1438172883"/>
       </p:ext>
     </p:extLst>
   </p:cSld>

</xml_diff>

<commit_message>
dev analyze nb and update slides
</commit_message>
<xml_diff>
--- a/PNREC/PNREC slides.pptx
+++ b/PNREC/PNREC slides.pptx
@@ -14,17 +14,18 @@
     <p:sldId id="260" r:id="rId8"/>
     <p:sldId id="269" r:id="rId9"/>
     <p:sldId id="275" r:id="rId10"/>
-    <p:sldId id="277" r:id="rId11"/>
-    <p:sldId id="261" r:id="rId12"/>
-    <p:sldId id="267" r:id="rId13"/>
+    <p:sldId id="261" r:id="rId11"/>
+    <p:sldId id="267" r:id="rId12"/>
+    <p:sldId id="277" r:id="rId13"/>
     <p:sldId id="271" r:id="rId14"/>
     <p:sldId id="263" r:id="rId15"/>
     <p:sldId id="273" r:id="rId16"/>
     <p:sldId id="274" r:id="rId17"/>
     <p:sldId id="278" r:id="rId18"/>
     <p:sldId id="280" r:id="rId19"/>
-    <p:sldId id="264" r:id="rId20"/>
-    <p:sldId id="279" r:id="rId21"/>
+    <p:sldId id="281" r:id="rId20"/>
+    <p:sldId id="264" r:id="rId21"/>
+    <p:sldId id="279" r:id="rId22"/>
   </p:sldIdLst>
   <p:sldSz cx="12192000" cy="6858000"/>
   <p:notesSz cx="6858000" cy="9144000"/>
@@ -296,7 +297,7 @@
           <a:p>
             <a:fld id="{72EA7947-E287-4738-8C82-07CE4F01EF03}" type="datetime2">
               <a:rPr lang="en-US" smtClean="0"/>
-              <a:t>Friday, May 17, 2024</a:t>
+              <a:t>Monday, May 20, 2024</a:t>
             </a:fld>
             <a:endParaRPr lang="en-US" dirty="0"/>
           </a:p>
@@ -1332,7 +1333,7 @@
           <a:p>
             <a:fld id="{EE2EBD84-71F4-4271-8C46-0D47C0A9B12E}" type="datetime2">
               <a:rPr lang="en-US" smtClean="0"/>
-              <a:t>Friday, May 17, 2024</a:t>
+              <a:t>Monday, May 20, 2024</a:t>
             </a:fld>
             <a:endParaRPr lang="en-US"/>
           </a:p>
@@ -1543,7 +1544,7 @@
           <a:p>
             <a:fld id="{ABAE0CE1-F450-4107-B2CB-17B18F8A3F4A}" type="datetime2">
               <a:rPr lang="en-US" smtClean="0"/>
-              <a:t>Friday, May 17, 2024</a:t>
+              <a:t>Monday, May 20, 2024</a:t>
             </a:fld>
             <a:endParaRPr lang="en-US"/>
           </a:p>
@@ -2253,7 +2254,7 @@
           <a:p>
             <a:fld id="{6FE8C025-CD7A-4966-867E-81CF82B15267}" type="datetime2">
               <a:rPr lang="en-US" smtClean="0"/>
-              <a:t>Friday, May 17, 2024</a:t>
+              <a:t>Monday, May 20, 2024</a:t>
             </a:fld>
             <a:endParaRPr lang="en-US"/>
           </a:p>
@@ -2873,7 +2874,7 @@
           <a:p>
             <a:fld id="{FE809929-0719-4517-94D6-FDF7F99E70F6}" type="datetime2">
               <a:rPr lang="en-US" smtClean="0"/>
-              <a:t>Friday, May 17, 2024</a:t>
+              <a:t>Monday, May 20, 2024</a:t>
             </a:fld>
             <a:endParaRPr lang="en-US"/>
           </a:p>
@@ -3991,7 +3992,7 @@
           <a:p>
             <a:fld id="{20E95673-5512-4AAA-9AEB-E00C61EC65D5}" type="datetime2">
               <a:rPr lang="en-US" smtClean="0"/>
-              <a:t>Friday, May 17, 2024</a:t>
+              <a:t>Monday, May 20, 2024</a:t>
             </a:fld>
             <a:endParaRPr lang="en-US"/>
           </a:p>
@@ -4538,7 +4539,7 @@
           <a:p>
             <a:fld id="{C13138FA-2E87-4873-8BBA-13E447C9A99A}" type="datetime2">
               <a:rPr lang="en-US" smtClean="0"/>
-              <a:t>Friday, May 17, 2024</a:t>
+              <a:t>Monday, May 20, 2024</a:t>
             </a:fld>
             <a:endParaRPr lang="en-US"/>
           </a:p>
@@ -4699,7 +4700,7 @@
           <a:p>
             <a:fld id="{D75BB40A-97BD-4BFB-B639-0BFF95FDE8B7}" type="datetime2">
               <a:rPr lang="en-US" smtClean="0"/>
-              <a:t>Friday, May 17, 2024</a:t>
+              <a:t>Monday, May 20, 2024</a:t>
             </a:fld>
             <a:endParaRPr lang="en-US"/>
           </a:p>
@@ -5734,7 +5735,7 @@
           <a:p>
             <a:fld id="{9EE9E0E3-ECF6-4CFE-8698-AEFEBCECC3C0}" type="datetime2">
               <a:rPr lang="en-US" smtClean="0"/>
-              <a:t>Friday, May 17, 2024</a:t>
+              <a:t>Monday, May 20, 2024</a:t>
             </a:fld>
             <a:endParaRPr lang="en-US"/>
           </a:p>
@@ -6380,7 +6381,7 @@
           <a:p>
             <a:fld id="{251462FC-960E-4740-921F-B36862979F21}" type="datetime2">
               <a:rPr lang="en-US" smtClean="0"/>
-              <a:t>Friday, May 17, 2024</a:t>
+              <a:t>Monday, May 20, 2024</a:t>
             </a:fld>
             <a:endParaRPr lang="en-US"/>
           </a:p>
@@ -7144,7 +7145,7 @@
           <a:p>
             <a:fld id="{E50BC9E2-CB44-4C05-9BB5-496C18A241E0}" type="datetime2">
               <a:rPr lang="en-US" smtClean="0"/>
-              <a:t>Friday, May 17, 2024</a:t>
+              <a:t>Monday, May 20, 2024</a:t>
             </a:fld>
             <a:endParaRPr lang="en-US"/>
           </a:p>
@@ -7397,7 +7398,7 @@
           <a:p>
             <a:fld id="{246CB39B-5F4C-4A7E-9BE3-AAFD45576D16}" type="datetime2">
               <a:rPr lang="en-US" smtClean="0"/>
-              <a:t>Friday, May 17, 2024</a:t>
+              <a:t>Monday, May 20, 2024</a:t>
             </a:fld>
             <a:endParaRPr lang="en-US" dirty="0"/>
           </a:p>
@@ -8726,66 +8727,6 @@
           <a:chExt cx="0" cy="0"/>
         </a:xfrm>
       </p:grpSpPr>
-      <p:pic>
-        <p:nvPicPr>
-          <p:cNvPr id="7" name="Picture 6" descr="A graph of a cargo ship&#10;&#10;Description automatically generated with medium confidence">
-            <a:extLst>
-              <a:ext uri="{FF2B5EF4-FFF2-40B4-BE49-F238E27FC236}">
-                <a16:creationId xmlns:a16="http://schemas.microsoft.com/office/drawing/2014/main" id="{5EBA9F59-BC0C-8F3C-1D0E-96BC6ECF9C6A}"/>
-              </a:ext>
-            </a:extLst>
-          </p:cNvPr>
-          <p:cNvPicPr>
-            <a:picLocks noChangeAspect="1"/>
-          </p:cNvPicPr>
-          <p:nvPr/>
-        </p:nvPicPr>
-        <p:blipFill>
-          <a:blip r:embed="rId2"/>
-          <a:stretch>
-            <a:fillRect/>
-          </a:stretch>
-        </p:blipFill>
-        <p:spPr>
-          <a:xfrm>
-            <a:off x="358140" y="241300"/>
-            <a:ext cx="11475720" cy="6375400"/>
-          </a:xfrm>
-          <a:prstGeom prst="rect">
-            <a:avLst/>
-          </a:prstGeom>
-        </p:spPr>
-      </p:pic>
-    </p:spTree>
-    <p:extLst>
-      <p:ext uri="{BB962C8B-B14F-4D97-AF65-F5344CB8AC3E}">
-        <p14:creationId xmlns:p14="http://schemas.microsoft.com/office/powerpoint/2010/main" val="32356986"/>
-      </p:ext>
-    </p:extLst>
-  </p:cSld>
-  <p:clrMapOvr>
-    <a:masterClrMapping/>
-  </p:clrMapOvr>
-</p:sld>
-</file>
-
-<file path=ppt/slides/slide11.xml><?xml version="1.0" encoding="utf-8"?>
-<p:sld xmlns:a="http://schemas.openxmlformats.org/drawingml/2006/main" xmlns:r="http://schemas.openxmlformats.org/officeDocument/2006/relationships" xmlns:p="http://schemas.openxmlformats.org/presentationml/2006/main">
-  <p:cSld>
-    <p:spTree>
-      <p:nvGrpSpPr>
-        <p:cNvPr id="1" name=""/>
-        <p:cNvGrpSpPr/>
-        <p:nvPr/>
-      </p:nvGrpSpPr>
-      <p:grpSpPr>
-        <a:xfrm>
-          <a:off x="0" y="0"/>
-          <a:ext cx="0" cy="0"/>
-          <a:chOff x="0" y="0"/>
-          <a:chExt cx="0" cy="0"/>
-        </a:xfrm>
-      </p:grpSpPr>
       <p:sp>
         <p:nvSpPr>
           <p:cNvPr id="2" name="Title 1">
@@ -8814,8 +8755,8 @@
           </a:p>
         </p:txBody>
       </p:sp>
-      <mc:AlternateContent xmlns:mc="http://schemas.openxmlformats.org/markup-compatibility/2006">
-        <mc:Choice xmlns:a14="http://schemas.microsoft.com/office/drawing/2010/main" Requires="a14">
+      <mc:AlternateContent xmlns:mc="http://schemas.openxmlformats.org/markup-compatibility/2006" xmlns:a14="http://schemas.microsoft.com/office/drawing/2010/main">
+        <mc:Choice Requires="a14">
           <p:sp>
             <p:nvSpPr>
               <p:cNvPr id="3" name="Content Placeholder 2">
@@ -9008,7 +8949,7 @@
             </p:txBody>
           </p:sp>
         </mc:Choice>
-        <mc:Fallback>
+        <mc:Fallback xmlns="">
           <p:sp>
             <p:nvSpPr>
               <p:cNvPr id="3" name="Content Placeholder 2">
@@ -9061,7 +9002,7 @@
 </p:sld>
 </file>
 
-<file path=ppt/slides/slide12.xml><?xml version="1.0" encoding="utf-8"?>
+<file path=ppt/slides/slide11.xml><?xml version="1.0" encoding="utf-8"?>
 <p:sld xmlns:a="http://schemas.openxmlformats.org/drawingml/2006/main" xmlns:r="http://schemas.openxmlformats.org/officeDocument/2006/relationships" xmlns:p="http://schemas.openxmlformats.org/presentationml/2006/main">
   <p:cSld>
     <p:spTree>
@@ -9147,6 +9088,66 @@
     <p:extLst>
       <p:ext uri="{BB962C8B-B14F-4D97-AF65-F5344CB8AC3E}">
         <p14:creationId xmlns:p14="http://schemas.microsoft.com/office/powerpoint/2010/main" val="2517794356"/>
+      </p:ext>
+    </p:extLst>
+  </p:cSld>
+  <p:clrMapOvr>
+    <a:masterClrMapping/>
+  </p:clrMapOvr>
+</p:sld>
+</file>
+
+<file path=ppt/slides/slide12.xml><?xml version="1.0" encoding="utf-8"?>
+<p:sld xmlns:a="http://schemas.openxmlformats.org/drawingml/2006/main" xmlns:r="http://schemas.openxmlformats.org/officeDocument/2006/relationships" xmlns:p="http://schemas.openxmlformats.org/presentationml/2006/main">
+  <p:cSld>
+    <p:spTree>
+      <p:nvGrpSpPr>
+        <p:cNvPr id="1" name=""/>
+        <p:cNvGrpSpPr/>
+        <p:nvPr/>
+      </p:nvGrpSpPr>
+      <p:grpSpPr>
+        <a:xfrm>
+          <a:off x="0" y="0"/>
+          <a:ext cx="0" cy="0"/>
+          <a:chOff x="0" y="0"/>
+          <a:chExt cx="0" cy="0"/>
+        </a:xfrm>
+      </p:grpSpPr>
+      <p:pic>
+        <p:nvPicPr>
+          <p:cNvPr id="3" name="Picture 2" descr="A graph of different colored lines&#10;&#10;Description automatically generated">
+            <a:extLst>
+              <a:ext uri="{FF2B5EF4-FFF2-40B4-BE49-F238E27FC236}">
+                <a16:creationId xmlns:a16="http://schemas.microsoft.com/office/drawing/2014/main" id="{12E08F26-CF4B-736A-9BF3-668F96B713BA}"/>
+              </a:ext>
+            </a:extLst>
+          </p:cNvPr>
+          <p:cNvPicPr>
+            <a:picLocks noChangeAspect="1"/>
+          </p:cNvPicPr>
+          <p:nvPr/>
+        </p:nvPicPr>
+        <p:blipFill>
+          <a:blip r:embed="rId2"/>
+          <a:stretch>
+            <a:fillRect/>
+          </a:stretch>
+        </p:blipFill>
+        <p:spPr>
+          <a:xfrm>
+            <a:off x="0" y="658090"/>
+            <a:ext cx="12192000" cy="5541816"/>
+          </a:xfrm>
+          <a:prstGeom prst="rect">
+            <a:avLst/>
+          </a:prstGeom>
+        </p:spPr>
+      </p:pic>
+    </p:spTree>
+    <p:extLst>
+      <p:ext uri="{BB962C8B-B14F-4D97-AF65-F5344CB8AC3E}">
+        <p14:creationId xmlns:p14="http://schemas.microsoft.com/office/powerpoint/2010/main" val="32356986"/>
       </p:ext>
     </p:extLst>
   </p:cSld>
@@ -9175,10 +9176,10 @@
       </p:grpSpPr>
       <p:pic>
         <p:nvPicPr>
-          <p:cNvPr id="3" name="Picture 2" descr="A graph of a line graph&#10;&#10;Description automatically generated with medium confidence">
-            <a:extLst>
-              <a:ext uri="{FF2B5EF4-FFF2-40B4-BE49-F238E27FC236}">
-                <a16:creationId xmlns:a16="http://schemas.microsoft.com/office/drawing/2014/main" id="{8978D35C-2A8C-C73F-B3C6-BCEC75E940DA}"/>
+          <p:cNvPr id="2" name="Picture 1">
+            <a:extLst>
+              <a:ext uri="{FF2B5EF4-FFF2-40B4-BE49-F238E27FC236}">
+                <a16:creationId xmlns:a16="http://schemas.microsoft.com/office/drawing/2014/main" id="{CC1CF00F-535A-B9D9-C103-645B7BA05003}"/>
               </a:ext>
             </a:extLst>
           </p:cNvPr>
@@ -9195,8 +9196,8 @@
         </p:blipFill>
         <p:spPr>
           <a:xfrm>
-            <a:off x="442856" y="288364"/>
-            <a:ext cx="11306288" cy="6281271"/>
+            <a:off x="335280" y="228600"/>
+            <a:ext cx="11521440" cy="6400800"/>
           </a:xfrm>
           <a:prstGeom prst="rect">
             <a:avLst/>
@@ -9235,10 +9236,10 @@
       </p:grpSpPr>
       <p:pic>
         <p:nvPicPr>
-          <p:cNvPr id="3" name="Picture 2" descr="A graph with different colored lines&#10;&#10;Description automatically generated">
-            <a:extLst>
-              <a:ext uri="{FF2B5EF4-FFF2-40B4-BE49-F238E27FC236}">
-                <a16:creationId xmlns:a16="http://schemas.microsoft.com/office/drawing/2014/main" id="{0EFFA968-E5D5-C03D-4858-3B07DE37C5B9}"/>
+          <p:cNvPr id="2" name="Picture 1">
+            <a:extLst>
+              <a:ext uri="{FF2B5EF4-FFF2-40B4-BE49-F238E27FC236}">
+                <a16:creationId xmlns:a16="http://schemas.microsoft.com/office/drawing/2014/main" id="{D6C8576F-7DB3-D510-10C6-245B9E7BFBE0}"/>
               </a:ext>
             </a:extLst>
           </p:cNvPr>
@@ -9255,8 +9256,8 @@
         </p:blipFill>
         <p:spPr>
           <a:xfrm>
-            <a:off x="370242" y="248023"/>
-            <a:ext cx="11451515" cy="6361953"/>
+            <a:off x="381000" y="254000"/>
+            <a:ext cx="11430000" cy="6350000"/>
           </a:xfrm>
           <a:prstGeom prst="rect">
             <a:avLst/>
@@ -9295,10 +9296,10 @@
       </p:grpSpPr>
       <p:pic>
         <p:nvPicPr>
-          <p:cNvPr id="3" name="Picture 2" descr="A graph with red and blue lines&#10;&#10;Description automatically generated">
-            <a:extLst>
-              <a:ext uri="{FF2B5EF4-FFF2-40B4-BE49-F238E27FC236}">
-                <a16:creationId xmlns:a16="http://schemas.microsoft.com/office/drawing/2014/main" id="{4D25BF75-541D-EBE6-7D64-5CA8551F4EA7}"/>
+          <p:cNvPr id="2" name="Picture 1">
+            <a:extLst>
+              <a:ext uri="{FF2B5EF4-FFF2-40B4-BE49-F238E27FC236}">
+                <a16:creationId xmlns:a16="http://schemas.microsoft.com/office/drawing/2014/main" id="{9E2EAF86-99AE-71F1-18B6-A30EDE341CE3}"/>
               </a:ext>
             </a:extLst>
           </p:cNvPr>
@@ -9315,8 +9316,8 @@
         </p:blipFill>
         <p:spPr>
           <a:xfrm>
-            <a:off x="382344" y="254747"/>
-            <a:ext cx="11427311" cy="6348506"/>
+            <a:off x="381000" y="254000"/>
+            <a:ext cx="11430000" cy="6350000"/>
           </a:xfrm>
           <a:prstGeom prst="rect">
             <a:avLst/>
@@ -9355,10 +9356,10 @@
       </p:grpSpPr>
       <p:pic>
         <p:nvPicPr>
-          <p:cNvPr id="2" name="Picture 1">
-            <a:extLst>
-              <a:ext uri="{FF2B5EF4-FFF2-40B4-BE49-F238E27FC236}">
-                <a16:creationId xmlns:a16="http://schemas.microsoft.com/office/drawing/2014/main" id="{BDC6B69A-B9DF-7904-3A16-17B29A97AB56}"/>
+          <p:cNvPr id="3" name="Picture 2">
+            <a:extLst>
+              <a:ext uri="{FF2B5EF4-FFF2-40B4-BE49-F238E27FC236}">
+                <a16:creationId xmlns:a16="http://schemas.microsoft.com/office/drawing/2014/main" id="{BF15E949-11C4-A1BA-3C41-94F20EF0E27F}"/>
               </a:ext>
             </a:extLst>
           </p:cNvPr>
@@ -9375,8 +9376,8 @@
         </p:blipFill>
         <p:spPr>
           <a:xfrm>
-            <a:off x="394447" y="261470"/>
-            <a:ext cx="11403106" cy="6335059"/>
+            <a:off x="381000" y="254000"/>
+            <a:ext cx="11430000" cy="6350000"/>
           </a:xfrm>
           <a:prstGeom prst="rect">
             <a:avLst/>
@@ -9415,10 +9416,10 @@
       </p:grpSpPr>
       <p:pic>
         <p:nvPicPr>
-          <p:cNvPr id="9" name="Picture 8" descr="A graph showing different colored lines&#10;&#10;Description automatically generated">
-            <a:extLst>
-              <a:ext uri="{FF2B5EF4-FFF2-40B4-BE49-F238E27FC236}">
-                <a16:creationId xmlns:a16="http://schemas.microsoft.com/office/drawing/2014/main" id="{6B76795C-3A41-D845-1059-B4BBD20B3BBF}"/>
+          <p:cNvPr id="2" name="Picture 1">
+            <a:extLst>
+              <a:ext uri="{FF2B5EF4-FFF2-40B4-BE49-F238E27FC236}">
+                <a16:creationId xmlns:a16="http://schemas.microsoft.com/office/drawing/2014/main" id="{596B27E6-2C24-8D7B-4F2E-7794F23C27E2}"/>
               </a:ext>
             </a:extLst>
           </p:cNvPr>
@@ -9435,8 +9436,8 @@
         </p:blipFill>
         <p:spPr>
           <a:xfrm>
-            <a:off x="461010" y="298450"/>
-            <a:ext cx="11269980" cy="6261100"/>
+            <a:off x="495300" y="317500"/>
+            <a:ext cx="11201400" cy="6223000"/>
           </a:xfrm>
           <a:prstGeom prst="rect">
             <a:avLst/>
@@ -9475,10 +9476,10 @@
       </p:grpSpPr>
       <p:pic>
         <p:nvPicPr>
-          <p:cNvPr id="4" name="Picture 3">
-            <a:extLst>
-              <a:ext uri="{FF2B5EF4-FFF2-40B4-BE49-F238E27FC236}">
-                <a16:creationId xmlns:a16="http://schemas.microsoft.com/office/drawing/2014/main" id="{C9429CBE-7422-29F2-FD09-923F35F300F5}"/>
+          <p:cNvPr id="2" name="Picture 1">
+            <a:extLst>
+              <a:ext uri="{FF2B5EF4-FFF2-40B4-BE49-F238E27FC236}">
+                <a16:creationId xmlns:a16="http://schemas.microsoft.com/office/drawing/2014/main" id="{2BB294BC-E94C-920E-55D1-8227D828141D}"/>
               </a:ext>
             </a:extLst>
           </p:cNvPr>
@@ -9495,38 +9496,8 @@
         </p:blipFill>
         <p:spPr>
           <a:xfrm>
-            <a:off x="148046" y="1304731"/>
-            <a:ext cx="5947954" cy="4248538"/>
-          </a:xfrm>
-          <a:prstGeom prst="rect">
-            <a:avLst/>
-          </a:prstGeom>
-        </p:spPr>
-      </p:pic>
-      <p:pic>
-        <p:nvPicPr>
-          <p:cNvPr id="5" name="Picture 4">
-            <a:extLst>
-              <a:ext uri="{FF2B5EF4-FFF2-40B4-BE49-F238E27FC236}">
-                <a16:creationId xmlns:a16="http://schemas.microsoft.com/office/drawing/2014/main" id="{0C65F3B3-E7DF-488D-A940-832F80213416}"/>
-              </a:ext>
-            </a:extLst>
-          </p:cNvPr>
-          <p:cNvPicPr>
-            <a:picLocks noChangeAspect="1"/>
-          </p:cNvPicPr>
-          <p:nvPr/>
-        </p:nvPicPr>
-        <p:blipFill>
-          <a:blip r:embed="rId3"/>
-          <a:stretch>
-            <a:fillRect/>
-          </a:stretch>
-        </p:blipFill>
-        <p:spPr>
-          <a:xfrm>
-            <a:off x="6095999" y="1304729"/>
-            <a:ext cx="5947955" cy="4248540"/>
+            <a:off x="1606550" y="222250"/>
+            <a:ext cx="8978900" cy="6413500"/>
           </a:xfrm>
           <a:prstGeom prst="rect">
             <a:avLst/>
@@ -9563,75 +9534,40 @@
           <a:chExt cx="0" cy="0"/>
         </a:xfrm>
       </p:grpSpPr>
-      <p:sp>
-        <p:nvSpPr>
-          <p:cNvPr id="2" name="Title 1">
-            <a:extLst>
-              <a:ext uri="{FF2B5EF4-FFF2-40B4-BE49-F238E27FC236}">
-                <a16:creationId xmlns:a16="http://schemas.microsoft.com/office/drawing/2014/main" id="{19EAA029-7673-8249-43FC-31B91BEFE7BE}"/>
-              </a:ext>
-            </a:extLst>
-          </p:cNvPr>
-          <p:cNvSpPr>
-            <a:spLocks noGrp="1"/>
-          </p:cNvSpPr>
-          <p:nvPr>
-            <p:ph type="title"/>
-          </p:nvPr>
-        </p:nvSpPr>
-        <p:spPr/>
-        <p:txBody>
-          <a:bodyPr/>
-          <a:lstStyle/>
-          <a:p>
-            <a:r>
-              <a:rPr lang="en-US" dirty="0"/>
-              <a:t>Limitations</a:t>
-            </a:r>
-          </a:p>
-        </p:txBody>
-      </p:sp>
-      <p:sp>
-        <p:nvSpPr>
-          <p:cNvPr id="3" name="Content Placeholder 2">
-            <a:extLst>
-              <a:ext uri="{FF2B5EF4-FFF2-40B4-BE49-F238E27FC236}">
-                <a16:creationId xmlns:a16="http://schemas.microsoft.com/office/drawing/2014/main" id="{149A675F-7EE3-BF0E-23B9-DD104AB800E2}"/>
-              </a:ext>
-            </a:extLst>
-          </p:cNvPr>
-          <p:cNvSpPr>
-            <a:spLocks noGrp="1"/>
-          </p:cNvSpPr>
-          <p:nvPr>
-            <p:ph idx="1"/>
-          </p:nvPr>
-        </p:nvSpPr>
-        <p:spPr/>
-        <p:txBody>
-          <a:bodyPr/>
-          <a:lstStyle/>
-          <a:p>
-            <a:r>
-              <a:rPr lang="en-US" dirty="0"/>
-              <a:t>The PIERS data do not include empty haul</a:t>
-            </a:r>
-          </a:p>
-          <a:p>
-            <a:r>
-              <a:rPr lang="en-US" dirty="0"/>
-              <a:t>OCAs are only one form of vessel sharing agreements (VSA); we do not observe any other form of VSA. </a:t>
-            </a:r>
-          </a:p>
-          <a:p>
-            <a:endParaRPr lang="en-US" dirty="0"/>
-          </a:p>
-        </p:txBody>
-      </p:sp>
+      <p:pic>
+        <p:nvPicPr>
+          <p:cNvPr id="4" name="Picture 3">
+            <a:extLst>
+              <a:ext uri="{FF2B5EF4-FFF2-40B4-BE49-F238E27FC236}">
+                <a16:creationId xmlns:a16="http://schemas.microsoft.com/office/drawing/2014/main" id="{669A8788-EAF7-6E61-4E09-9D50C9E6A628}"/>
+              </a:ext>
+            </a:extLst>
+          </p:cNvPr>
+          <p:cNvPicPr>
+            <a:picLocks noChangeAspect="1"/>
+          </p:cNvPicPr>
+          <p:nvPr/>
+        </p:nvPicPr>
+        <p:blipFill>
+          <a:blip r:embed="rId2"/>
+          <a:stretch>
+            <a:fillRect/>
+          </a:stretch>
+        </p:blipFill>
+        <p:spPr>
+          <a:xfrm>
+            <a:off x="952500" y="0"/>
+            <a:ext cx="10287000" cy="6858000"/>
+          </a:xfrm>
+          <a:prstGeom prst="rect">
+            <a:avLst/>
+          </a:prstGeom>
+        </p:spPr>
+      </p:pic>
     </p:spTree>
     <p:extLst>
       <p:ext uri="{BB962C8B-B14F-4D97-AF65-F5344CB8AC3E}">
-        <p14:creationId xmlns:p14="http://schemas.microsoft.com/office/powerpoint/2010/main" val="1936259183"/>
+        <p14:creationId xmlns:p14="http://schemas.microsoft.com/office/powerpoint/2010/main" val="180870616"/>
       </p:ext>
     </p:extLst>
   </p:cSld>
@@ -9766,6 +9702,101 @@
 </file>
 
 <file path=ppt/slides/slide20.xml><?xml version="1.0" encoding="utf-8"?>
+<p:sld xmlns:a="http://schemas.openxmlformats.org/drawingml/2006/main" xmlns:r="http://schemas.openxmlformats.org/officeDocument/2006/relationships" xmlns:p="http://schemas.openxmlformats.org/presentationml/2006/main">
+  <p:cSld>
+    <p:spTree>
+      <p:nvGrpSpPr>
+        <p:cNvPr id="1" name=""/>
+        <p:cNvGrpSpPr/>
+        <p:nvPr/>
+      </p:nvGrpSpPr>
+      <p:grpSpPr>
+        <a:xfrm>
+          <a:off x="0" y="0"/>
+          <a:ext cx="0" cy="0"/>
+          <a:chOff x="0" y="0"/>
+          <a:chExt cx="0" cy="0"/>
+        </a:xfrm>
+      </p:grpSpPr>
+      <p:sp>
+        <p:nvSpPr>
+          <p:cNvPr id="2" name="Title 1">
+            <a:extLst>
+              <a:ext uri="{FF2B5EF4-FFF2-40B4-BE49-F238E27FC236}">
+                <a16:creationId xmlns:a16="http://schemas.microsoft.com/office/drawing/2014/main" id="{19EAA029-7673-8249-43FC-31B91BEFE7BE}"/>
+              </a:ext>
+            </a:extLst>
+          </p:cNvPr>
+          <p:cNvSpPr>
+            <a:spLocks noGrp="1"/>
+          </p:cNvSpPr>
+          <p:nvPr>
+            <p:ph type="title"/>
+          </p:nvPr>
+        </p:nvSpPr>
+        <p:spPr/>
+        <p:txBody>
+          <a:bodyPr/>
+          <a:lstStyle/>
+          <a:p>
+            <a:r>
+              <a:rPr lang="en-US" dirty="0"/>
+              <a:t>Limitations</a:t>
+            </a:r>
+          </a:p>
+        </p:txBody>
+      </p:sp>
+      <p:sp>
+        <p:nvSpPr>
+          <p:cNvPr id="3" name="Content Placeholder 2">
+            <a:extLst>
+              <a:ext uri="{FF2B5EF4-FFF2-40B4-BE49-F238E27FC236}">
+                <a16:creationId xmlns:a16="http://schemas.microsoft.com/office/drawing/2014/main" id="{149A675F-7EE3-BF0E-23B9-DD104AB800E2}"/>
+              </a:ext>
+            </a:extLst>
+          </p:cNvPr>
+          <p:cNvSpPr>
+            <a:spLocks noGrp="1"/>
+          </p:cNvSpPr>
+          <p:nvPr>
+            <p:ph idx="1"/>
+          </p:nvPr>
+        </p:nvSpPr>
+        <p:spPr/>
+        <p:txBody>
+          <a:bodyPr/>
+          <a:lstStyle/>
+          <a:p>
+            <a:r>
+              <a:rPr lang="en-US" dirty="0"/>
+              <a:t>The PIERS data do not include empty haul</a:t>
+            </a:r>
+          </a:p>
+          <a:p>
+            <a:r>
+              <a:rPr lang="en-US" dirty="0"/>
+              <a:t>OCAs are only one form of vessel sharing agreements (VSA); we do not observe any other form of VSA. </a:t>
+            </a:r>
+          </a:p>
+          <a:p>
+            <a:endParaRPr lang="en-US" dirty="0"/>
+          </a:p>
+        </p:txBody>
+      </p:sp>
+    </p:spTree>
+    <p:extLst>
+      <p:ext uri="{BB962C8B-B14F-4D97-AF65-F5344CB8AC3E}">
+        <p14:creationId xmlns:p14="http://schemas.microsoft.com/office/powerpoint/2010/main" val="1936259183"/>
+      </p:ext>
+    </p:extLst>
+  </p:cSld>
+  <p:clrMapOvr>
+    <a:masterClrMapping/>
+  </p:clrMapOvr>
+</p:sld>
+</file>
+
+<file path=ppt/slides/slide21.xml><?xml version="1.0" encoding="utf-8"?>
 <p:sld xmlns:a="http://schemas.openxmlformats.org/drawingml/2006/main" xmlns:r="http://schemas.openxmlformats.org/officeDocument/2006/relationships" xmlns:p="http://schemas.openxmlformats.org/presentationml/2006/main">
   <p:cSld>
     <p:spTree>

</xml_diff>

<commit_message>
update nb and slides
</commit_message>
<xml_diff>
--- a/PNREC/PNREC slides.pptx
+++ b/PNREC/PNREC slides.pptx
@@ -7,9 +7,9 @@
   <p:sldIdLst>
     <p:sldId id="256" r:id="rId2"/>
     <p:sldId id="257" r:id="rId3"/>
-    <p:sldId id="258" r:id="rId4"/>
-    <p:sldId id="270" r:id="rId5"/>
-    <p:sldId id="272" r:id="rId6"/>
+    <p:sldId id="270" r:id="rId4"/>
+    <p:sldId id="272" r:id="rId5"/>
+    <p:sldId id="258" r:id="rId6"/>
     <p:sldId id="268" r:id="rId7"/>
     <p:sldId id="260" r:id="rId8"/>
     <p:sldId id="269" r:id="rId9"/>
@@ -17,15 +17,16 @@
     <p:sldId id="261" r:id="rId11"/>
     <p:sldId id="267" r:id="rId12"/>
     <p:sldId id="277" r:id="rId13"/>
-    <p:sldId id="271" r:id="rId14"/>
+    <p:sldId id="282" r:id="rId14"/>
     <p:sldId id="263" r:id="rId15"/>
-    <p:sldId id="273" r:id="rId16"/>
-    <p:sldId id="274" r:id="rId17"/>
-    <p:sldId id="278" r:id="rId18"/>
-    <p:sldId id="280" r:id="rId19"/>
-    <p:sldId id="281" r:id="rId20"/>
-    <p:sldId id="264" r:id="rId21"/>
-    <p:sldId id="279" r:id="rId22"/>
+    <p:sldId id="271" r:id="rId16"/>
+    <p:sldId id="273" r:id="rId17"/>
+    <p:sldId id="274" r:id="rId18"/>
+    <p:sldId id="278" r:id="rId19"/>
+    <p:sldId id="280" r:id="rId20"/>
+    <p:sldId id="281" r:id="rId21"/>
+    <p:sldId id="264" r:id="rId22"/>
+    <p:sldId id="279" r:id="rId23"/>
   </p:sldIdLst>
   <p:sldSz cx="12192000" cy="6858000"/>
   <p:notesSz cx="6858000" cy="9144000"/>
@@ -9176,10 +9177,10 @@
       </p:grpSpPr>
       <p:pic>
         <p:nvPicPr>
-          <p:cNvPr id="2" name="Picture 1">
-            <a:extLst>
-              <a:ext uri="{FF2B5EF4-FFF2-40B4-BE49-F238E27FC236}">
-                <a16:creationId xmlns:a16="http://schemas.microsoft.com/office/drawing/2014/main" id="{CC1CF00F-535A-B9D9-C103-645B7BA05003}"/>
+          <p:cNvPr id="5" name="Picture 4" descr="A graph of different colored lines&#10;&#10;Description automatically generated">
+            <a:extLst>
+              <a:ext uri="{FF2B5EF4-FFF2-40B4-BE49-F238E27FC236}">
+                <a16:creationId xmlns:a16="http://schemas.microsoft.com/office/drawing/2014/main" id="{4DFCC526-2BD8-D201-DF89-E230C4BFDC53}"/>
               </a:ext>
             </a:extLst>
           </p:cNvPr>
@@ -9196,8 +9197,8 @@
         </p:blipFill>
         <p:spPr>
           <a:xfrm>
-            <a:off x="335280" y="228600"/>
-            <a:ext cx="11521440" cy="6400800"/>
+            <a:off x="0" y="659245"/>
+            <a:ext cx="12186926" cy="5539510"/>
           </a:xfrm>
           <a:prstGeom prst="rect">
             <a:avLst/>
@@ -9207,7 +9208,7 @@
     </p:spTree>
     <p:extLst>
       <p:ext uri="{BB962C8B-B14F-4D97-AF65-F5344CB8AC3E}">
-        <p14:creationId xmlns:p14="http://schemas.microsoft.com/office/powerpoint/2010/main" val="4048034761"/>
+        <p14:creationId xmlns:p14="http://schemas.microsoft.com/office/powerpoint/2010/main" val="1854961387"/>
       </p:ext>
     </p:extLst>
   </p:cSld>
@@ -9299,6 +9300,66 @@
           <p:cNvPr id="2" name="Picture 1">
             <a:extLst>
               <a:ext uri="{FF2B5EF4-FFF2-40B4-BE49-F238E27FC236}">
+                <a16:creationId xmlns:a16="http://schemas.microsoft.com/office/drawing/2014/main" id="{CC1CF00F-535A-B9D9-C103-645B7BA05003}"/>
+              </a:ext>
+            </a:extLst>
+          </p:cNvPr>
+          <p:cNvPicPr>
+            <a:picLocks noChangeAspect="1"/>
+          </p:cNvPicPr>
+          <p:nvPr/>
+        </p:nvPicPr>
+        <p:blipFill>
+          <a:blip r:embed="rId2"/>
+          <a:stretch>
+            <a:fillRect/>
+          </a:stretch>
+        </p:blipFill>
+        <p:spPr>
+          <a:xfrm>
+            <a:off x="335280" y="228600"/>
+            <a:ext cx="11521440" cy="6400800"/>
+          </a:xfrm>
+          <a:prstGeom prst="rect">
+            <a:avLst/>
+          </a:prstGeom>
+        </p:spPr>
+      </p:pic>
+    </p:spTree>
+    <p:extLst>
+      <p:ext uri="{BB962C8B-B14F-4D97-AF65-F5344CB8AC3E}">
+        <p14:creationId xmlns:p14="http://schemas.microsoft.com/office/powerpoint/2010/main" val="4048034761"/>
+      </p:ext>
+    </p:extLst>
+  </p:cSld>
+  <p:clrMapOvr>
+    <a:masterClrMapping/>
+  </p:clrMapOvr>
+</p:sld>
+</file>
+
+<file path=ppt/slides/slide16.xml><?xml version="1.0" encoding="utf-8"?>
+<p:sld xmlns:a="http://schemas.openxmlformats.org/drawingml/2006/main" xmlns:r="http://schemas.openxmlformats.org/officeDocument/2006/relationships" xmlns:p="http://schemas.openxmlformats.org/presentationml/2006/main">
+  <p:cSld>
+    <p:spTree>
+      <p:nvGrpSpPr>
+        <p:cNvPr id="1" name=""/>
+        <p:cNvGrpSpPr/>
+        <p:nvPr/>
+      </p:nvGrpSpPr>
+      <p:grpSpPr>
+        <a:xfrm>
+          <a:off x="0" y="0"/>
+          <a:ext cx="0" cy="0"/>
+          <a:chOff x="0" y="0"/>
+          <a:chExt cx="0" cy="0"/>
+        </a:xfrm>
+      </p:grpSpPr>
+      <p:pic>
+        <p:nvPicPr>
+          <p:cNvPr id="2" name="Picture 1">
+            <a:extLst>
+              <a:ext uri="{FF2B5EF4-FFF2-40B4-BE49-F238E27FC236}">
                 <a16:creationId xmlns:a16="http://schemas.microsoft.com/office/drawing/2014/main" id="{9E2EAF86-99AE-71F1-18B6-A30EDE341CE3}"/>
               </a:ext>
             </a:extLst>
@@ -9337,7 +9398,7 @@
 </p:sld>
 </file>
 
-<file path=ppt/slides/slide16.xml><?xml version="1.0" encoding="utf-8"?>
+<file path=ppt/slides/slide17.xml><?xml version="1.0" encoding="utf-8"?>
 <p:sld xmlns:a="http://schemas.openxmlformats.org/drawingml/2006/main" xmlns:r="http://schemas.openxmlformats.org/officeDocument/2006/relationships" xmlns:p="http://schemas.openxmlformats.org/presentationml/2006/main">
   <p:cSld>
     <p:spTree>
@@ -9397,7 +9458,7 @@
 </p:sld>
 </file>
 
-<file path=ppt/slides/slide17.xml><?xml version="1.0" encoding="utf-8"?>
+<file path=ppt/slides/slide18.xml><?xml version="1.0" encoding="utf-8"?>
 <p:sld xmlns:a="http://schemas.openxmlformats.org/drawingml/2006/main" xmlns:r="http://schemas.openxmlformats.org/officeDocument/2006/relationships" xmlns:p="http://schemas.openxmlformats.org/presentationml/2006/main">
   <p:cSld>
     <p:spTree>
@@ -9457,7 +9518,7 @@
 </p:sld>
 </file>
 
-<file path=ppt/slides/slide18.xml><?xml version="1.0" encoding="utf-8"?>
+<file path=ppt/slides/slide19.xml><?xml version="1.0" encoding="utf-8"?>
 <p:sld xmlns:a="http://schemas.openxmlformats.org/drawingml/2006/main" xmlns:r="http://schemas.openxmlformats.org/officeDocument/2006/relationships" xmlns:p="http://schemas.openxmlformats.org/presentationml/2006/main">
   <p:cSld>
     <p:spTree>
@@ -9517,7 +9578,131 @@
 </p:sld>
 </file>
 
-<file path=ppt/slides/slide19.xml><?xml version="1.0" encoding="utf-8"?>
+<file path=ppt/slides/slide2.xml><?xml version="1.0" encoding="utf-8"?>
+<p:sld xmlns:a="http://schemas.openxmlformats.org/drawingml/2006/main" xmlns:r="http://schemas.openxmlformats.org/officeDocument/2006/relationships" xmlns:p="http://schemas.openxmlformats.org/presentationml/2006/main">
+  <p:cSld>
+    <p:spTree>
+      <p:nvGrpSpPr>
+        <p:cNvPr id="1" name=""/>
+        <p:cNvGrpSpPr/>
+        <p:nvPr/>
+      </p:nvGrpSpPr>
+      <p:grpSpPr>
+        <a:xfrm>
+          <a:off x="0" y="0"/>
+          <a:ext cx="0" cy="0"/>
+          <a:chOff x="0" y="0"/>
+          <a:chExt cx="0" cy="0"/>
+        </a:xfrm>
+      </p:grpSpPr>
+      <p:sp>
+        <p:nvSpPr>
+          <p:cNvPr id="2" name="Title 1">
+            <a:extLst>
+              <a:ext uri="{FF2B5EF4-FFF2-40B4-BE49-F238E27FC236}">
+                <a16:creationId xmlns:a16="http://schemas.microsoft.com/office/drawing/2014/main" id="{BDF4B1EA-023E-71A0-2641-C6EE20CC7065}"/>
+              </a:ext>
+            </a:extLst>
+          </p:cNvPr>
+          <p:cNvSpPr>
+            <a:spLocks noGrp="1"/>
+          </p:cNvSpPr>
+          <p:nvPr>
+            <p:ph type="title"/>
+          </p:nvPr>
+        </p:nvSpPr>
+        <p:spPr/>
+        <p:txBody>
+          <a:bodyPr>
+            <a:normAutofit fontScale="90000"/>
+          </a:bodyPr>
+          <a:lstStyle/>
+          <a:p>
+            <a:r>
+              <a:rPr lang="en-US" dirty="0"/>
+              <a:t>What are Ocean Carrier Alliances (OCAs)?</a:t>
+            </a:r>
+          </a:p>
+        </p:txBody>
+      </p:sp>
+      <p:sp>
+        <p:nvSpPr>
+          <p:cNvPr id="3" name="Content Placeholder 2">
+            <a:extLst>
+              <a:ext uri="{FF2B5EF4-FFF2-40B4-BE49-F238E27FC236}">
+                <a16:creationId xmlns:a16="http://schemas.microsoft.com/office/drawing/2014/main" id="{D37FBFD0-94EE-33A7-024C-F20DBBEA4FCF}"/>
+              </a:ext>
+            </a:extLst>
+          </p:cNvPr>
+          <p:cNvSpPr>
+            <a:spLocks noGrp="1"/>
+          </p:cNvSpPr>
+          <p:nvPr>
+            <p:ph idx="1"/>
+          </p:nvPr>
+        </p:nvSpPr>
+        <p:spPr/>
+        <p:txBody>
+          <a:bodyPr/>
+          <a:lstStyle/>
+          <a:p>
+            <a:r>
+              <a:rPr lang="en-US" dirty="0"/>
+              <a:t>Cooperative sharing agreements between maritime freight carriers</a:t>
+            </a:r>
+          </a:p>
+          <a:p>
+            <a:pPr lvl="1"/>
+            <a:r>
+              <a:rPr lang="en-US" dirty="0"/>
+              <a:t>e.g., Maersk will carry some cargo for Mediterranean and vice versa </a:t>
+            </a:r>
+          </a:p>
+          <a:p>
+            <a:r>
+              <a:rPr lang="en-US" dirty="0"/>
+              <a:t>OCAs allow carriers to offer additional services (e.g., additional lanes) and more efficiently allocate capacity.</a:t>
+            </a:r>
+          </a:p>
+          <a:p>
+            <a:pPr lvl="1"/>
+            <a:r>
+              <a:rPr lang="en-US" dirty="0"/>
+              <a:t>Carriers can utilize larger ships by filling volume from other carriers.</a:t>
+            </a:r>
+          </a:p>
+          <a:p>
+            <a:r>
+              <a:rPr lang="en-US" dirty="0"/>
+              <a:t>The impact on shippers/consumers is not well studied. </a:t>
+            </a:r>
+          </a:p>
+          <a:p>
+            <a:pPr lvl="1"/>
+            <a:r>
+              <a:rPr lang="en-US" dirty="0"/>
+              <a:t>For example, carriers sometimes offer very low prices on otherwise-used capacity in order to minimize empty haul. Under an alliance agreement, this capacity might be sold at normal prices to another carrier.  </a:t>
+            </a:r>
+          </a:p>
+          <a:p>
+            <a:endParaRPr lang="en-US" dirty="0"/>
+          </a:p>
+        </p:txBody>
+      </p:sp>
+    </p:spTree>
+    <p:extLst>
+      <p:ext uri="{BB962C8B-B14F-4D97-AF65-F5344CB8AC3E}">
+        <p14:creationId xmlns:p14="http://schemas.microsoft.com/office/powerpoint/2010/main" val="1623064167"/>
+      </p:ext>
+    </p:extLst>
+  </p:cSld>
+  <p:clrMapOvr>
+    <a:masterClrMapping/>
+  </p:clrMapOvr>
+</p:sld>
+</file>
+
+<file path=ppt/slides/slide20.xml><?xml version="1.0" encoding="utf-8"?>
 <p:sld xmlns:a="http://schemas.openxmlformats.org/drawingml/2006/main" xmlns:r="http://schemas.openxmlformats.org/officeDocument/2006/relationships" xmlns:p="http://schemas.openxmlformats.org/presentationml/2006/main">
   <p:cSld>
     <p:spTree>
@@ -9577,225 +9762,6 @@
 </p:sld>
 </file>
 
-<file path=ppt/slides/slide2.xml><?xml version="1.0" encoding="utf-8"?>
-<p:sld xmlns:a="http://schemas.openxmlformats.org/drawingml/2006/main" xmlns:r="http://schemas.openxmlformats.org/officeDocument/2006/relationships" xmlns:p="http://schemas.openxmlformats.org/presentationml/2006/main">
-  <p:cSld>
-    <p:spTree>
-      <p:nvGrpSpPr>
-        <p:cNvPr id="1" name=""/>
-        <p:cNvGrpSpPr/>
-        <p:nvPr/>
-      </p:nvGrpSpPr>
-      <p:grpSpPr>
-        <a:xfrm>
-          <a:off x="0" y="0"/>
-          <a:ext cx="0" cy="0"/>
-          <a:chOff x="0" y="0"/>
-          <a:chExt cx="0" cy="0"/>
-        </a:xfrm>
-      </p:grpSpPr>
-      <p:sp>
-        <p:nvSpPr>
-          <p:cNvPr id="2" name="Title 1">
-            <a:extLst>
-              <a:ext uri="{FF2B5EF4-FFF2-40B4-BE49-F238E27FC236}">
-                <a16:creationId xmlns:a16="http://schemas.microsoft.com/office/drawing/2014/main" id="{BDF4B1EA-023E-71A0-2641-C6EE20CC7065}"/>
-              </a:ext>
-            </a:extLst>
-          </p:cNvPr>
-          <p:cNvSpPr>
-            <a:spLocks noGrp="1"/>
-          </p:cNvSpPr>
-          <p:nvPr>
-            <p:ph type="title"/>
-          </p:nvPr>
-        </p:nvSpPr>
-        <p:spPr/>
-        <p:txBody>
-          <a:bodyPr>
-            <a:normAutofit fontScale="90000"/>
-          </a:bodyPr>
-          <a:lstStyle/>
-          <a:p>
-            <a:r>
-              <a:rPr lang="en-US" dirty="0"/>
-              <a:t>What are Ocean Carrier Alliances (OCAs)?</a:t>
-            </a:r>
-          </a:p>
-        </p:txBody>
-      </p:sp>
-      <p:sp>
-        <p:nvSpPr>
-          <p:cNvPr id="3" name="Content Placeholder 2">
-            <a:extLst>
-              <a:ext uri="{FF2B5EF4-FFF2-40B4-BE49-F238E27FC236}">
-                <a16:creationId xmlns:a16="http://schemas.microsoft.com/office/drawing/2014/main" id="{D37FBFD0-94EE-33A7-024C-F20DBBEA4FCF}"/>
-              </a:ext>
-            </a:extLst>
-          </p:cNvPr>
-          <p:cNvSpPr>
-            <a:spLocks noGrp="1"/>
-          </p:cNvSpPr>
-          <p:nvPr>
-            <p:ph idx="1"/>
-          </p:nvPr>
-        </p:nvSpPr>
-        <p:spPr/>
-        <p:txBody>
-          <a:bodyPr/>
-          <a:lstStyle/>
-          <a:p>
-            <a:r>
-              <a:rPr lang="en-US" dirty="0"/>
-              <a:t>Cooperative sharing agreements between maritime freight carriers</a:t>
-            </a:r>
-          </a:p>
-          <a:p>
-            <a:pPr lvl="1"/>
-            <a:r>
-              <a:rPr lang="en-US" dirty="0"/>
-              <a:t>e.g., Maersk will carry some cargo for Mediterranean and vice versa </a:t>
-            </a:r>
-          </a:p>
-          <a:p>
-            <a:r>
-              <a:rPr lang="en-US" dirty="0"/>
-              <a:t>OCAs allow carriers to offer additional services (e.g., additional lanes) and more efficiently allocate capacity.</a:t>
-            </a:r>
-          </a:p>
-          <a:p>
-            <a:pPr lvl="1"/>
-            <a:r>
-              <a:rPr lang="en-US" dirty="0"/>
-              <a:t>Carriers can utilize larger ships by filling volume from other carriers.</a:t>
-            </a:r>
-          </a:p>
-          <a:p>
-            <a:r>
-              <a:rPr lang="en-US" dirty="0"/>
-              <a:t>The impact on shippers/consumers is not well studied. </a:t>
-            </a:r>
-          </a:p>
-          <a:p>
-            <a:pPr lvl="1"/>
-            <a:r>
-              <a:rPr lang="en-US" dirty="0"/>
-              <a:t>For example, carriers sometimes offer very low prices on otherwise-used capacity in order to minimize empty haul. Under an alliance agreement, this capacity might be sold at normal prices to another carrier.  </a:t>
-            </a:r>
-          </a:p>
-          <a:p>
-            <a:endParaRPr lang="en-US" dirty="0"/>
-          </a:p>
-        </p:txBody>
-      </p:sp>
-    </p:spTree>
-    <p:extLst>
-      <p:ext uri="{BB962C8B-B14F-4D97-AF65-F5344CB8AC3E}">
-        <p14:creationId xmlns:p14="http://schemas.microsoft.com/office/powerpoint/2010/main" val="1623064167"/>
-      </p:ext>
-    </p:extLst>
-  </p:cSld>
-  <p:clrMapOvr>
-    <a:masterClrMapping/>
-  </p:clrMapOvr>
-</p:sld>
-</file>
-
-<file path=ppt/slides/slide20.xml><?xml version="1.0" encoding="utf-8"?>
-<p:sld xmlns:a="http://schemas.openxmlformats.org/drawingml/2006/main" xmlns:r="http://schemas.openxmlformats.org/officeDocument/2006/relationships" xmlns:p="http://schemas.openxmlformats.org/presentationml/2006/main">
-  <p:cSld>
-    <p:spTree>
-      <p:nvGrpSpPr>
-        <p:cNvPr id="1" name=""/>
-        <p:cNvGrpSpPr/>
-        <p:nvPr/>
-      </p:nvGrpSpPr>
-      <p:grpSpPr>
-        <a:xfrm>
-          <a:off x="0" y="0"/>
-          <a:ext cx="0" cy="0"/>
-          <a:chOff x="0" y="0"/>
-          <a:chExt cx="0" cy="0"/>
-        </a:xfrm>
-      </p:grpSpPr>
-      <p:sp>
-        <p:nvSpPr>
-          <p:cNvPr id="2" name="Title 1">
-            <a:extLst>
-              <a:ext uri="{FF2B5EF4-FFF2-40B4-BE49-F238E27FC236}">
-                <a16:creationId xmlns:a16="http://schemas.microsoft.com/office/drawing/2014/main" id="{19EAA029-7673-8249-43FC-31B91BEFE7BE}"/>
-              </a:ext>
-            </a:extLst>
-          </p:cNvPr>
-          <p:cNvSpPr>
-            <a:spLocks noGrp="1"/>
-          </p:cNvSpPr>
-          <p:nvPr>
-            <p:ph type="title"/>
-          </p:nvPr>
-        </p:nvSpPr>
-        <p:spPr/>
-        <p:txBody>
-          <a:bodyPr/>
-          <a:lstStyle/>
-          <a:p>
-            <a:r>
-              <a:rPr lang="en-US" dirty="0"/>
-              <a:t>Limitations</a:t>
-            </a:r>
-          </a:p>
-        </p:txBody>
-      </p:sp>
-      <p:sp>
-        <p:nvSpPr>
-          <p:cNvPr id="3" name="Content Placeholder 2">
-            <a:extLst>
-              <a:ext uri="{FF2B5EF4-FFF2-40B4-BE49-F238E27FC236}">
-                <a16:creationId xmlns:a16="http://schemas.microsoft.com/office/drawing/2014/main" id="{149A675F-7EE3-BF0E-23B9-DD104AB800E2}"/>
-              </a:ext>
-            </a:extLst>
-          </p:cNvPr>
-          <p:cNvSpPr>
-            <a:spLocks noGrp="1"/>
-          </p:cNvSpPr>
-          <p:nvPr>
-            <p:ph idx="1"/>
-          </p:nvPr>
-        </p:nvSpPr>
-        <p:spPr/>
-        <p:txBody>
-          <a:bodyPr/>
-          <a:lstStyle/>
-          <a:p>
-            <a:r>
-              <a:rPr lang="en-US" dirty="0"/>
-              <a:t>The PIERS data do not include empty haul</a:t>
-            </a:r>
-          </a:p>
-          <a:p>
-            <a:r>
-              <a:rPr lang="en-US" dirty="0"/>
-              <a:t>OCAs are only one form of vessel sharing agreements (VSA); we do not observe any other form of VSA. </a:t>
-            </a:r>
-          </a:p>
-          <a:p>
-            <a:endParaRPr lang="en-US" dirty="0"/>
-          </a:p>
-        </p:txBody>
-      </p:sp>
-    </p:spTree>
-    <p:extLst>
-      <p:ext uri="{BB962C8B-B14F-4D97-AF65-F5344CB8AC3E}">
-        <p14:creationId xmlns:p14="http://schemas.microsoft.com/office/powerpoint/2010/main" val="1936259183"/>
-      </p:ext>
-    </p:extLst>
-  </p:cSld>
-  <p:clrMapOvr>
-    <a:masterClrMapping/>
-  </p:clrMapOvr>
-</p:sld>
-</file>
-
 <file path=ppt/slides/slide21.xml><?xml version="1.0" encoding="utf-8"?>
 <p:sld xmlns:a="http://schemas.openxmlformats.org/drawingml/2006/main" xmlns:r="http://schemas.openxmlformats.org/officeDocument/2006/relationships" xmlns:p="http://schemas.openxmlformats.org/presentationml/2006/main">
   <p:cSld>
@@ -9818,7 +9784,7 @@
           <p:cNvPr id="2" name="Title 1">
             <a:extLst>
               <a:ext uri="{FF2B5EF4-FFF2-40B4-BE49-F238E27FC236}">
-                <a16:creationId xmlns:a16="http://schemas.microsoft.com/office/drawing/2014/main" id="{851E7B48-98AC-7B25-CB3D-8CBBC598C220}"/>
+                <a16:creationId xmlns:a16="http://schemas.microsoft.com/office/drawing/2014/main" id="{19EAA029-7673-8249-43FC-31B91BEFE7BE}"/>
               </a:ext>
             </a:extLst>
           </p:cNvPr>
@@ -9836,7 +9802,7 @@
           <a:p>
             <a:r>
               <a:rPr lang="en-US" dirty="0"/>
-              <a:t>Concluding Remarks</a:t>
+              <a:t>Limitations</a:t>
             </a:r>
           </a:p>
         </p:txBody>
@@ -9846,7 +9812,7 @@
           <p:cNvPr id="3" name="Content Placeholder 2">
             <a:extLst>
               <a:ext uri="{FF2B5EF4-FFF2-40B4-BE49-F238E27FC236}">
-                <a16:creationId xmlns:a16="http://schemas.microsoft.com/office/drawing/2014/main" id="{8AD0A0AA-0740-6721-568D-C75B7993EC59}"/>
+                <a16:creationId xmlns:a16="http://schemas.microsoft.com/office/drawing/2014/main" id="{149A675F-7EE3-BF0E-23B9-DD104AB800E2}"/>
               </a:ext>
             </a:extLst>
           </p:cNvPr>
@@ -9864,42 +9830,24 @@
           <a:p>
             <a:r>
               <a:rPr lang="en-US" dirty="0"/>
-              <a:t>Alliance utilization varies over time and across lanes</a:t>
+              <a:t>The PIERS data do not include empty haul</a:t>
             </a:r>
           </a:p>
           <a:p>
             <a:r>
               <a:rPr lang="en-US" dirty="0"/>
-              <a:t>Impacts on producers depend on utilization</a:t>
-            </a:r>
-          </a:p>
-          <a:p>
-            <a:r>
-              <a:rPr lang="en-US" dirty="0"/>
-              <a:t>Study results re: US ag producers expected this fall</a:t>
-            </a:r>
-          </a:p>
-          <a:p>
-            <a:r>
-              <a:rPr lang="en-US" dirty="0"/>
-              <a:t>Questions and comments welcome!</a:t>
-            </a:r>
-          </a:p>
-          <a:p>
-            <a:pPr marL="0" indent="0" algn="ctr">
-              <a:buNone/>
-            </a:pPr>
-            <a:r>
-              <a:rPr lang="en-US" dirty="0"/>
-              <a:t>adam.wilson1@wsu.edu</a:t>
-            </a:r>
+              <a:t>OCAs are only one form of vessel sharing agreements (VSA); we do not observe any other form of VSA. </a:t>
+            </a:r>
+          </a:p>
+          <a:p>
+            <a:endParaRPr lang="en-US" dirty="0"/>
           </a:p>
         </p:txBody>
       </p:sp>
     </p:spTree>
     <p:extLst>
       <p:ext uri="{BB962C8B-B14F-4D97-AF65-F5344CB8AC3E}">
-        <p14:creationId xmlns:p14="http://schemas.microsoft.com/office/powerpoint/2010/main" val="3929261373"/>
+        <p14:creationId xmlns:p14="http://schemas.microsoft.com/office/powerpoint/2010/main" val="1936259183"/>
       </p:ext>
     </p:extLst>
   </p:cSld>
@@ -9909,7 +9857,7 @@
 </p:sld>
 </file>
 
-<file path=ppt/slides/slide3.xml><?xml version="1.0" encoding="utf-8"?>
+<file path=ppt/slides/slide22.xml><?xml version="1.0" encoding="utf-8"?>
 <p:sld xmlns:a="http://schemas.openxmlformats.org/drawingml/2006/main" xmlns:r="http://schemas.openxmlformats.org/officeDocument/2006/relationships" xmlns:p="http://schemas.openxmlformats.org/presentationml/2006/main">
   <p:cSld>
     <p:spTree>
@@ -9931,7 +9879,7 @@
           <p:cNvPr id="2" name="Title 1">
             <a:extLst>
               <a:ext uri="{FF2B5EF4-FFF2-40B4-BE49-F238E27FC236}">
-                <a16:creationId xmlns:a16="http://schemas.microsoft.com/office/drawing/2014/main" id="{1755B255-42B9-C1B2-A31D-4AF7A1765882}"/>
+                <a16:creationId xmlns:a16="http://schemas.microsoft.com/office/drawing/2014/main" id="{851E7B48-98AC-7B25-CB3D-8CBBC598C220}"/>
               </a:ext>
             </a:extLst>
           </p:cNvPr>
@@ -9949,80 +9897,62 @@
           <a:p>
             <a:r>
               <a:rPr lang="en-US" dirty="0"/>
-              <a:t>A Brief History of Alliances</a:t>
+              <a:t>Concluding Remarks</a:t>
             </a:r>
           </a:p>
         </p:txBody>
       </p:sp>
-      <p:pic>
-        <p:nvPicPr>
-          <p:cNvPr id="7" name="Picture 6" descr="A screen shot of a computer&#10;&#10;Description automatically generated">
-            <a:extLst>
-              <a:ext uri="{FF2B5EF4-FFF2-40B4-BE49-F238E27FC236}">
-                <a16:creationId xmlns:a16="http://schemas.microsoft.com/office/drawing/2014/main" id="{A78AAFC6-1545-3678-51AC-68676CB0CD64}"/>
-              </a:ext>
-            </a:extLst>
-          </p:cNvPr>
-          <p:cNvPicPr>
-            <a:picLocks noChangeAspect="1"/>
-          </p:cNvPicPr>
-          <p:nvPr/>
-        </p:nvPicPr>
-        <p:blipFill>
-          <a:blip r:embed="rId2"/>
-          <a:stretch>
-            <a:fillRect/>
-          </a:stretch>
-        </p:blipFill>
-        <p:spPr>
-          <a:xfrm>
-            <a:off x="1444310" y="1040182"/>
-            <a:ext cx="9303380" cy="4996933"/>
-          </a:xfrm>
-          <a:prstGeom prst="rect">
-            <a:avLst/>
-          </a:prstGeom>
-        </p:spPr>
-      </p:pic>
       <p:sp>
         <p:nvSpPr>
-          <p:cNvPr id="8" name="TextBox 7">
-            <a:extLst>
-              <a:ext uri="{FF2B5EF4-FFF2-40B4-BE49-F238E27FC236}">
-                <a16:creationId xmlns:a16="http://schemas.microsoft.com/office/drawing/2014/main" id="{18206DCD-9F9A-82BD-D00C-9EFFDC57DADC}"/>
-              </a:ext>
-            </a:extLst>
-          </p:cNvPr>
-          <p:cNvSpPr txBox="1"/>
-          <p:nvPr/>
+          <p:cNvPr id="3" name="Content Placeholder 2">
+            <a:extLst>
+              <a:ext uri="{FF2B5EF4-FFF2-40B4-BE49-F238E27FC236}">
+                <a16:creationId xmlns:a16="http://schemas.microsoft.com/office/drawing/2014/main" id="{8AD0A0AA-0740-6721-568D-C75B7993EC59}"/>
+              </a:ext>
+            </a:extLst>
+          </p:cNvPr>
+          <p:cNvSpPr>
+            <a:spLocks noGrp="1"/>
+          </p:cNvSpPr>
+          <p:nvPr>
+            <p:ph idx="1"/>
+          </p:nvPr>
         </p:nvSpPr>
-        <p:spPr>
-          <a:xfrm>
-            <a:off x="7543800" y="6037115"/>
-            <a:ext cx="3717100" cy="369332"/>
-          </a:xfrm>
-          <a:prstGeom prst="rect">
-            <a:avLst/>
-          </a:prstGeom>
-          <a:noFill/>
-        </p:spPr>
+        <p:spPr/>
         <p:txBody>
-          <a:bodyPr wrap="square" rtlCol="0">
-            <a:spAutoFit/>
-          </a:bodyPr>
+          <a:bodyPr/>
           <a:lstStyle/>
           <a:p>
             <a:r>
-              <a:rPr lang="en-US" i="1" dirty="0"/>
-              <a:t>Source: Theo </a:t>
-            </a:r>
-            <a:r>
-              <a:rPr lang="en-US" i="1" dirty="0" err="1"/>
-              <a:t>Notteboom</a:t>
-            </a:r>
-            <a:r>
-              <a:rPr lang="en-US" i="1" dirty="0"/>
-              <a:t>, PEMP</a:t>
+              <a:rPr lang="en-US" dirty="0"/>
+              <a:t>Alliance utilization varies over time and across lanes</a:t>
+            </a:r>
+          </a:p>
+          <a:p>
+            <a:r>
+              <a:rPr lang="en-US" dirty="0"/>
+              <a:t>Impacts on producers depend on utilization</a:t>
+            </a:r>
+          </a:p>
+          <a:p>
+            <a:r>
+              <a:rPr lang="en-US" dirty="0"/>
+              <a:t>Study results re: US ag producers expected this fall</a:t>
+            </a:r>
+          </a:p>
+          <a:p>
+            <a:r>
+              <a:rPr lang="en-US" dirty="0"/>
+              <a:t>Questions and comments welcome!</a:t>
+            </a:r>
+          </a:p>
+          <a:p>
+            <a:pPr marL="0" indent="0" algn="ctr">
+              <a:buNone/>
+            </a:pPr>
+            <a:r>
+              <a:rPr lang="en-US" dirty="0"/>
+              <a:t>adam.wilson1@wsu.edu</a:t>
             </a:r>
           </a:p>
         </p:txBody>
@@ -10030,7 +9960,7 @@
     </p:spTree>
     <p:extLst>
       <p:ext uri="{BB962C8B-B14F-4D97-AF65-F5344CB8AC3E}">
-        <p14:creationId xmlns:p14="http://schemas.microsoft.com/office/powerpoint/2010/main" val="3206686003"/>
+        <p14:creationId xmlns:p14="http://schemas.microsoft.com/office/powerpoint/2010/main" val="3929261373"/>
       </p:ext>
     </p:extLst>
   </p:cSld>
@@ -10040,7 +9970,7 @@
 </p:sld>
 </file>
 
-<file path=ppt/slides/slide4.xml><?xml version="1.0" encoding="utf-8"?>
+<file path=ppt/slides/slide3.xml><?xml version="1.0" encoding="utf-8"?>
 <p:sld xmlns:a="http://schemas.openxmlformats.org/drawingml/2006/main" xmlns:r="http://schemas.openxmlformats.org/officeDocument/2006/relationships" xmlns:p="http://schemas.openxmlformats.org/presentationml/2006/main">
   <p:cSld>
     <p:spTree>
@@ -10100,7 +10030,7 @@
 </p:sld>
 </file>
 
-<file path=ppt/slides/slide5.xml><?xml version="1.0" encoding="utf-8"?>
+<file path=ppt/slides/slide4.xml><?xml version="1.0" encoding="utf-8"?>
 <p:sld xmlns:a="http://schemas.openxmlformats.org/drawingml/2006/main" xmlns:r="http://schemas.openxmlformats.org/officeDocument/2006/relationships" xmlns:p="http://schemas.openxmlformats.org/presentationml/2006/main">
   <p:cSld>
     <p:spTree>
@@ -10151,6 +10081,137 @@
     <p:extLst>
       <p:ext uri="{BB962C8B-B14F-4D97-AF65-F5344CB8AC3E}">
         <p14:creationId xmlns:p14="http://schemas.microsoft.com/office/powerpoint/2010/main" val="2094747406"/>
+      </p:ext>
+    </p:extLst>
+  </p:cSld>
+  <p:clrMapOvr>
+    <a:masterClrMapping/>
+  </p:clrMapOvr>
+</p:sld>
+</file>
+
+<file path=ppt/slides/slide5.xml><?xml version="1.0" encoding="utf-8"?>
+<p:sld xmlns:a="http://schemas.openxmlformats.org/drawingml/2006/main" xmlns:r="http://schemas.openxmlformats.org/officeDocument/2006/relationships" xmlns:p="http://schemas.openxmlformats.org/presentationml/2006/main">
+  <p:cSld>
+    <p:spTree>
+      <p:nvGrpSpPr>
+        <p:cNvPr id="1" name=""/>
+        <p:cNvGrpSpPr/>
+        <p:nvPr/>
+      </p:nvGrpSpPr>
+      <p:grpSpPr>
+        <a:xfrm>
+          <a:off x="0" y="0"/>
+          <a:ext cx="0" cy="0"/>
+          <a:chOff x="0" y="0"/>
+          <a:chExt cx="0" cy="0"/>
+        </a:xfrm>
+      </p:grpSpPr>
+      <p:sp>
+        <p:nvSpPr>
+          <p:cNvPr id="2" name="Title 1">
+            <a:extLst>
+              <a:ext uri="{FF2B5EF4-FFF2-40B4-BE49-F238E27FC236}">
+                <a16:creationId xmlns:a16="http://schemas.microsoft.com/office/drawing/2014/main" id="{1755B255-42B9-C1B2-A31D-4AF7A1765882}"/>
+              </a:ext>
+            </a:extLst>
+          </p:cNvPr>
+          <p:cNvSpPr>
+            <a:spLocks noGrp="1"/>
+          </p:cNvSpPr>
+          <p:nvPr>
+            <p:ph type="title"/>
+          </p:nvPr>
+        </p:nvSpPr>
+        <p:spPr/>
+        <p:txBody>
+          <a:bodyPr/>
+          <a:lstStyle/>
+          <a:p>
+            <a:r>
+              <a:rPr lang="en-US" dirty="0"/>
+              <a:t>A Brief History of Alliances</a:t>
+            </a:r>
+          </a:p>
+        </p:txBody>
+      </p:sp>
+      <p:pic>
+        <p:nvPicPr>
+          <p:cNvPr id="7" name="Picture 6" descr="A screen shot of a computer&#10;&#10;Description automatically generated">
+            <a:extLst>
+              <a:ext uri="{FF2B5EF4-FFF2-40B4-BE49-F238E27FC236}">
+                <a16:creationId xmlns:a16="http://schemas.microsoft.com/office/drawing/2014/main" id="{A78AAFC6-1545-3678-51AC-68676CB0CD64}"/>
+              </a:ext>
+            </a:extLst>
+          </p:cNvPr>
+          <p:cNvPicPr>
+            <a:picLocks noChangeAspect="1"/>
+          </p:cNvPicPr>
+          <p:nvPr/>
+        </p:nvPicPr>
+        <p:blipFill>
+          <a:blip r:embed="rId2"/>
+          <a:stretch>
+            <a:fillRect/>
+          </a:stretch>
+        </p:blipFill>
+        <p:spPr>
+          <a:xfrm>
+            <a:off x="1444310" y="1040182"/>
+            <a:ext cx="9303380" cy="4996933"/>
+          </a:xfrm>
+          <a:prstGeom prst="rect">
+            <a:avLst/>
+          </a:prstGeom>
+        </p:spPr>
+      </p:pic>
+      <p:sp>
+        <p:nvSpPr>
+          <p:cNvPr id="8" name="TextBox 7">
+            <a:extLst>
+              <a:ext uri="{FF2B5EF4-FFF2-40B4-BE49-F238E27FC236}">
+                <a16:creationId xmlns:a16="http://schemas.microsoft.com/office/drawing/2014/main" id="{18206DCD-9F9A-82BD-D00C-9EFFDC57DADC}"/>
+              </a:ext>
+            </a:extLst>
+          </p:cNvPr>
+          <p:cNvSpPr txBox="1"/>
+          <p:nvPr/>
+        </p:nvSpPr>
+        <p:spPr>
+          <a:xfrm>
+            <a:off x="7543800" y="6037115"/>
+            <a:ext cx="3717100" cy="369332"/>
+          </a:xfrm>
+          <a:prstGeom prst="rect">
+            <a:avLst/>
+          </a:prstGeom>
+          <a:noFill/>
+        </p:spPr>
+        <p:txBody>
+          <a:bodyPr wrap="square" rtlCol="0">
+            <a:spAutoFit/>
+          </a:bodyPr>
+          <a:lstStyle/>
+          <a:p>
+            <a:r>
+              <a:rPr lang="en-US" i="1" dirty="0"/>
+              <a:t>Source: Theo </a:t>
+            </a:r>
+            <a:r>
+              <a:rPr lang="en-US" i="1" dirty="0" err="1"/>
+              <a:t>Notteboom</a:t>
+            </a:r>
+            <a:r>
+              <a:rPr lang="en-US" i="1" dirty="0"/>
+              <a:t>, PEMP</a:t>
+            </a:r>
+          </a:p>
+        </p:txBody>
+      </p:sp>
+    </p:spTree>
+    <p:extLst>
+      <p:ext uri="{BB962C8B-B14F-4D97-AF65-F5344CB8AC3E}">
+        <p14:creationId xmlns:p14="http://schemas.microsoft.com/office/powerpoint/2010/main" val="3206686003"/>
       </p:ext>
     </p:extLst>
   </p:cSld>

</xml_diff>